<commit_message>
Update CS188 Note Series, Update Algorithm, Update Personalized components
</commit_message>
<xml_diff>
--- a/assets/images/banners/BannerCreator.pptx
+++ b/assets/images/banners/BannerCreator.pptx
@@ -7,6 +7,7 @@
   <p:sldIdLst>
     <p:sldId id="256" r:id="rId2"/>
     <p:sldId id="257" r:id="rId3"/>
+    <p:sldId id="258" r:id="rId4"/>
   </p:sldIdLst>
   <p:sldSz cx="12192000" cy="6858000"/>
   <p:notesSz cx="6858000" cy="9144000"/>
@@ -321,7 +322,7 @@
           <a:p>
             <a:fld id="{BD8AEB8B-F03B-4148-B37B-28C602FB6DA0}" type="datetimeFigureOut">
               <a:rPr lang="en-US" smtClean="0"/>
-              <a:t>5/2/2021</a:t>
+              <a:t>7/29/2021</a:t>
             </a:fld>
             <a:endParaRPr lang="en-US"/>
           </a:p>
@@ -519,7 +520,7 @@
           <a:p>
             <a:fld id="{BD8AEB8B-F03B-4148-B37B-28C602FB6DA0}" type="datetimeFigureOut">
               <a:rPr lang="en-US" smtClean="0"/>
-              <a:t>5/2/2021</a:t>
+              <a:t>7/29/2021</a:t>
             </a:fld>
             <a:endParaRPr lang="en-US"/>
           </a:p>
@@ -727,7 +728,7 @@
           <a:p>
             <a:fld id="{BD8AEB8B-F03B-4148-B37B-28C602FB6DA0}" type="datetimeFigureOut">
               <a:rPr lang="en-US" smtClean="0"/>
-              <a:t>5/2/2021</a:t>
+              <a:t>7/29/2021</a:t>
             </a:fld>
             <a:endParaRPr lang="en-US"/>
           </a:p>
@@ -925,7 +926,7 @@
           <a:p>
             <a:fld id="{BD8AEB8B-F03B-4148-B37B-28C602FB6DA0}" type="datetimeFigureOut">
               <a:rPr lang="en-US" smtClean="0"/>
-              <a:t>5/2/2021</a:t>
+              <a:t>7/29/2021</a:t>
             </a:fld>
             <a:endParaRPr lang="en-US"/>
           </a:p>
@@ -1200,7 +1201,7 @@
           <a:p>
             <a:fld id="{BD8AEB8B-F03B-4148-B37B-28C602FB6DA0}" type="datetimeFigureOut">
               <a:rPr lang="en-US" smtClean="0"/>
-              <a:t>5/2/2021</a:t>
+              <a:t>7/29/2021</a:t>
             </a:fld>
             <a:endParaRPr lang="en-US"/>
           </a:p>
@@ -1465,7 +1466,7 @@
           <a:p>
             <a:fld id="{BD8AEB8B-F03B-4148-B37B-28C602FB6DA0}" type="datetimeFigureOut">
               <a:rPr lang="en-US" smtClean="0"/>
-              <a:t>5/2/2021</a:t>
+              <a:t>7/29/2021</a:t>
             </a:fld>
             <a:endParaRPr lang="en-US"/>
           </a:p>
@@ -1877,7 +1878,7 @@
           <a:p>
             <a:fld id="{BD8AEB8B-F03B-4148-B37B-28C602FB6DA0}" type="datetimeFigureOut">
               <a:rPr lang="en-US" smtClean="0"/>
-              <a:t>5/2/2021</a:t>
+              <a:t>7/29/2021</a:t>
             </a:fld>
             <a:endParaRPr lang="en-US"/>
           </a:p>
@@ -2018,7 +2019,7 @@
           <a:p>
             <a:fld id="{BD8AEB8B-F03B-4148-B37B-28C602FB6DA0}" type="datetimeFigureOut">
               <a:rPr lang="en-US" smtClean="0"/>
-              <a:t>5/2/2021</a:t>
+              <a:t>7/29/2021</a:t>
             </a:fld>
             <a:endParaRPr lang="en-US"/>
           </a:p>
@@ -2131,7 +2132,7 @@
           <a:p>
             <a:fld id="{BD8AEB8B-F03B-4148-B37B-28C602FB6DA0}" type="datetimeFigureOut">
               <a:rPr lang="en-US" smtClean="0"/>
-              <a:t>5/2/2021</a:t>
+              <a:t>7/29/2021</a:t>
             </a:fld>
             <a:endParaRPr lang="en-US"/>
           </a:p>
@@ -2442,7 +2443,7 @@
           <a:p>
             <a:fld id="{BD8AEB8B-F03B-4148-B37B-28C602FB6DA0}" type="datetimeFigureOut">
               <a:rPr lang="en-US" smtClean="0"/>
-              <a:t>5/2/2021</a:t>
+              <a:t>7/29/2021</a:t>
             </a:fld>
             <a:endParaRPr lang="en-US"/>
           </a:p>
@@ -2730,7 +2731,7 @@
           <a:p>
             <a:fld id="{BD8AEB8B-F03B-4148-B37B-28C602FB6DA0}" type="datetimeFigureOut">
               <a:rPr lang="en-US" smtClean="0"/>
-              <a:t>5/2/2021</a:t>
+              <a:t>7/29/2021</a:t>
             </a:fld>
             <a:endParaRPr lang="en-US"/>
           </a:p>
@@ -2971,7 +2972,7 @@
           <a:p>
             <a:fld id="{BD8AEB8B-F03B-4148-B37B-28C602FB6DA0}" type="datetimeFigureOut">
               <a:rPr lang="en-US" smtClean="0"/>
-              <a:t>5/2/2021</a:t>
+              <a:t>7/29/2021</a:t>
             </a:fld>
             <a:endParaRPr lang="en-US"/>
           </a:p>
@@ -3633,6 +3634,135 @@
 </p:sld>
 </file>
 
+<file path=ppt/slides/slide3.xml><?xml version="1.0" encoding="utf-8"?>
+<p:sld xmlns:a="http://schemas.openxmlformats.org/drawingml/2006/main" xmlns:r="http://schemas.openxmlformats.org/officeDocument/2006/relationships" xmlns:p="http://schemas.openxmlformats.org/presentationml/2006/main">
+  <p:cSld>
+    <p:spTree>
+      <p:nvGrpSpPr>
+        <p:cNvPr id="1" name=""/>
+        <p:cNvGrpSpPr/>
+        <p:nvPr/>
+      </p:nvGrpSpPr>
+      <p:grpSpPr>
+        <a:xfrm>
+          <a:off x="0" y="0"/>
+          <a:ext cx="0" cy="0"/>
+          <a:chOff x="0" y="0"/>
+          <a:chExt cx="0" cy="0"/>
+        </a:xfrm>
+      </p:grpSpPr>
+      <p:sp>
+        <p:nvSpPr>
+          <p:cNvPr id="6" name="Rectangle 5">
+            <a:extLst>
+              <a:ext uri="{FF2B5EF4-FFF2-40B4-BE49-F238E27FC236}">
+                <a16:creationId xmlns:a16="http://schemas.microsoft.com/office/drawing/2014/main" id="{0439AF00-8634-4701-946F-B6029D9D9A9D}"/>
+              </a:ext>
+            </a:extLst>
+          </p:cNvPr>
+          <p:cNvSpPr/>
+          <p:nvPr/>
+        </p:nvSpPr>
+        <p:spPr>
+          <a:xfrm>
+            <a:off x="0" y="0"/>
+            <a:ext cx="12192000" cy="6858000"/>
+          </a:xfrm>
+          <a:prstGeom prst="rect">
+            <a:avLst/>
+          </a:prstGeom>
+          <a:solidFill>
+            <a:schemeClr val="tx1">
+              <a:lumMod val="85000"/>
+              <a:lumOff val="15000"/>
+            </a:schemeClr>
+          </a:solidFill>
+        </p:spPr>
+        <p:style>
+          <a:lnRef idx="2">
+            <a:schemeClr val="dk1">
+              <a:shade val="50000"/>
+            </a:schemeClr>
+          </a:lnRef>
+          <a:fillRef idx="1">
+            <a:schemeClr val="dk1"/>
+          </a:fillRef>
+          <a:effectRef idx="0">
+            <a:schemeClr val="dk1"/>
+          </a:effectRef>
+          <a:fontRef idx="minor">
+            <a:schemeClr val="lt1"/>
+          </a:fontRef>
+        </p:style>
+        <p:txBody>
+          <a:bodyPr rtlCol="0" anchor="ctr"/>
+          <a:lstStyle/>
+          <a:p>
+            <a:pPr algn="ctr"/>
+            <a:endParaRPr lang="en-US"/>
+          </a:p>
+        </p:txBody>
+      </p:sp>
+      <p:pic>
+        <p:nvPicPr>
+          <p:cNvPr id="1026" name="Picture 2">
+            <a:extLst>
+              <a:ext uri="{FF2B5EF4-FFF2-40B4-BE49-F238E27FC236}">
+                <a16:creationId xmlns:a16="http://schemas.microsoft.com/office/drawing/2014/main" id="{35D9BA0E-C1BA-4551-ADA3-30E6AEF9BEB3}"/>
+              </a:ext>
+            </a:extLst>
+          </p:cNvPr>
+          <p:cNvPicPr>
+            <a:picLocks noChangeAspect="1" noChangeArrowheads="1"/>
+          </p:cNvPicPr>
+          <p:nvPr/>
+        </p:nvPicPr>
+        <p:blipFill>
+          <a:blip r:embed="rId2">
+            <a:extLst>
+              <a:ext uri="{28A0092B-C50C-407E-A947-70E740481C1C}">
+                <a14:useLocalDpi xmlns:a14="http://schemas.microsoft.com/office/drawing/2010/main" val="0"/>
+              </a:ext>
+            </a:extLst>
+          </a:blip>
+          <a:srcRect/>
+          <a:stretch>
+            <a:fillRect/>
+          </a:stretch>
+        </p:blipFill>
+        <p:spPr bwMode="auto">
+          <a:xfrm>
+            <a:off x="7579305" y="2165639"/>
+            <a:ext cx="4500992" cy="2526722"/>
+          </a:xfrm>
+          <a:prstGeom prst="rect">
+            <a:avLst/>
+          </a:prstGeom>
+          <a:noFill/>
+          <a:extLst>
+            <a:ext uri="{909E8E84-426E-40DD-AFC4-6F175D3DCCD1}">
+              <a14:hiddenFill xmlns:a14="http://schemas.microsoft.com/office/drawing/2010/main">
+                <a:solidFill>
+                  <a:srgbClr val="FFFFFF"/>
+                </a:solidFill>
+              </a14:hiddenFill>
+            </a:ext>
+          </a:extLst>
+        </p:spPr>
+      </p:pic>
+    </p:spTree>
+    <p:extLst>
+      <p:ext uri="{BB962C8B-B14F-4D97-AF65-F5344CB8AC3E}">
+        <p14:creationId xmlns:p14="http://schemas.microsoft.com/office/powerpoint/2010/main" val="2817492898"/>
+      </p:ext>
+    </p:extLst>
+  </p:cSld>
+  <p:clrMapOvr>
+    <a:masterClrMapping/>
+  </p:clrMapOvr>
+</p:sld>
+</file>
+
 <file path=ppt/theme/theme1.xml><?xml version="1.0" encoding="utf-8"?>
 <a:theme xmlns:a="http://schemas.openxmlformats.org/drawingml/2006/main" name="Office Theme">
   <a:themeElements>

</xml_diff>

<commit_message>
Update Asset, attempt to fix scss
</commit_message>
<xml_diff>
--- a/assets/images/banners/BannerCreator.pptx
+++ b/assets/images/banners/BannerCreator.pptx
@@ -8,6 +8,7 @@
     <p:sldId id="256" r:id="rId2"/>
     <p:sldId id="257" r:id="rId3"/>
     <p:sldId id="258" r:id="rId4"/>
+    <p:sldId id="259" r:id="rId5"/>
   </p:sldIdLst>
   <p:sldSz cx="12192000" cy="6858000"/>
   <p:notesSz cx="6858000" cy="9144000"/>
@@ -322,7 +323,7 @@
           <a:p>
             <a:fld id="{BD8AEB8B-F03B-4148-B37B-28C602FB6DA0}" type="datetimeFigureOut">
               <a:rPr lang="en-US" smtClean="0"/>
-              <a:t>7/29/2021</a:t>
+              <a:t>8/7/2021</a:t>
             </a:fld>
             <a:endParaRPr lang="en-US"/>
           </a:p>
@@ -520,7 +521,7 @@
           <a:p>
             <a:fld id="{BD8AEB8B-F03B-4148-B37B-28C602FB6DA0}" type="datetimeFigureOut">
               <a:rPr lang="en-US" smtClean="0"/>
-              <a:t>7/29/2021</a:t>
+              <a:t>8/7/2021</a:t>
             </a:fld>
             <a:endParaRPr lang="en-US"/>
           </a:p>
@@ -728,7 +729,7 @@
           <a:p>
             <a:fld id="{BD8AEB8B-F03B-4148-B37B-28C602FB6DA0}" type="datetimeFigureOut">
               <a:rPr lang="en-US" smtClean="0"/>
-              <a:t>7/29/2021</a:t>
+              <a:t>8/7/2021</a:t>
             </a:fld>
             <a:endParaRPr lang="en-US"/>
           </a:p>
@@ -926,7 +927,7 @@
           <a:p>
             <a:fld id="{BD8AEB8B-F03B-4148-B37B-28C602FB6DA0}" type="datetimeFigureOut">
               <a:rPr lang="en-US" smtClean="0"/>
-              <a:t>7/29/2021</a:t>
+              <a:t>8/7/2021</a:t>
             </a:fld>
             <a:endParaRPr lang="en-US"/>
           </a:p>
@@ -1201,7 +1202,7 @@
           <a:p>
             <a:fld id="{BD8AEB8B-F03B-4148-B37B-28C602FB6DA0}" type="datetimeFigureOut">
               <a:rPr lang="en-US" smtClean="0"/>
-              <a:t>7/29/2021</a:t>
+              <a:t>8/7/2021</a:t>
             </a:fld>
             <a:endParaRPr lang="en-US"/>
           </a:p>
@@ -1466,7 +1467,7 @@
           <a:p>
             <a:fld id="{BD8AEB8B-F03B-4148-B37B-28C602FB6DA0}" type="datetimeFigureOut">
               <a:rPr lang="en-US" smtClean="0"/>
-              <a:t>7/29/2021</a:t>
+              <a:t>8/7/2021</a:t>
             </a:fld>
             <a:endParaRPr lang="en-US"/>
           </a:p>
@@ -1878,7 +1879,7 @@
           <a:p>
             <a:fld id="{BD8AEB8B-F03B-4148-B37B-28C602FB6DA0}" type="datetimeFigureOut">
               <a:rPr lang="en-US" smtClean="0"/>
-              <a:t>7/29/2021</a:t>
+              <a:t>8/7/2021</a:t>
             </a:fld>
             <a:endParaRPr lang="en-US"/>
           </a:p>
@@ -2019,7 +2020,7 @@
           <a:p>
             <a:fld id="{BD8AEB8B-F03B-4148-B37B-28C602FB6DA0}" type="datetimeFigureOut">
               <a:rPr lang="en-US" smtClean="0"/>
-              <a:t>7/29/2021</a:t>
+              <a:t>8/7/2021</a:t>
             </a:fld>
             <a:endParaRPr lang="en-US"/>
           </a:p>
@@ -2132,7 +2133,7 @@
           <a:p>
             <a:fld id="{BD8AEB8B-F03B-4148-B37B-28C602FB6DA0}" type="datetimeFigureOut">
               <a:rPr lang="en-US" smtClean="0"/>
-              <a:t>7/29/2021</a:t>
+              <a:t>8/7/2021</a:t>
             </a:fld>
             <a:endParaRPr lang="en-US"/>
           </a:p>
@@ -2443,7 +2444,7 @@
           <a:p>
             <a:fld id="{BD8AEB8B-F03B-4148-B37B-28C602FB6DA0}" type="datetimeFigureOut">
               <a:rPr lang="en-US" smtClean="0"/>
-              <a:t>7/29/2021</a:t>
+              <a:t>8/7/2021</a:t>
             </a:fld>
             <a:endParaRPr lang="en-US"/>
           </a:p>
@@ -2731,7 +2732,7 @@
           <a:p>
             <a:fld id="{BD8AEB8B-F03B-4148-B37B-28C602FB6DA0}" type="datetimeFigureOut">
               <a:rPr lang="en-US" smtClean="0"/>
-              <a:t>7/29/2021</a:t>
+              <a:t>8/7/2021</a:t>
             </a:fld>
             <a:endParaRPr lang="en-US"/>
           </a:p>
@@ -2972,7 +2973,7 @@
           <a:p>
             <a:fld id="{BD8AEB8B-F03B-4148-B37B-28C602FB6DA0}" type="datetimeFigureOut">
               <a:rPr lang="en-US" smtClean="0"/>
-              <a:t>7/29/2021</a:t>
+              <a:t>8/7/2021</a:t>
             </a:fld>
             <a:endParaRPr lang="en-US"/>
           </a:p>
@@ -3763,6 +3764,171 @@
 </p:sld>
 </file>
 
+<file path=ppt/slides/slide4.xml><?xml version="1.0" encoding="utf-8"?>
+<p:sld xmlns:a="http://schemas.openxmlformats.org/drawingml/2006/main" xmlns:r="http://schemas.openxmlformats.org/officeDocument/2006/relationships" xmlns:p="http://schemas.openxmlformats.org/presentationml/2006/main">
+  <p:cSld>
+    <p:spTree>
+      <p:nvGrpSpPr>
+        <p:cNvPr id="1" name=""/>
+        <p:cNvGrpSpPr/>
+        <p:nvPr/>
+      </p:nvGrpSpPr>
+      <p:grpSpPr>
+        <a:xfrm>
+          <a:off x="0" y="0"/>
+          <a:ext cx="0" cy="0"/>
+          <a:chOff x="0" y="0"/>
+          <a:chExt cx="0" cy="0"/>
+        </a:xfrm>
+      </p:grpSpPr>
+      <p:sp>
+        <p:nvSpPr>
+          <p:cNvPr id="6" name="Rectangle 5">
+            <a:extLst>
+              <a:ext uri="{FF2B5EF4-FFF2-40B4-BE49-F238E27FC236}">
+                <a16:creationId xmlns:a16="http://schemas.microsoft.com/office/drawing/2014/main" id="{0439AF00-8634-4701-946F-B6029D9D9A9D}"/>
+              </a:ext>
+            </a:extLst>
+          </p:cNvPr>
+          <p:cNvSpPr/>
+          <p:nvPr/>
+        </p:nvSpPr>
+        <p:spPr>
+          <a:xfrm>
+            <a:off x="0" y="0"/>
+            <a:ext cx="12192000" cy="6858000"/>
+          </a:xfrm>
+          <a:prstGeom prst="rect">
+            <a:avLst/>
+          </a:prstGeom>
+          <a:solidFill>
+            <a:schemeClr val="tx1">
+              <a:lumMod val="85000"/>
+              <a:lumOff val="15000"/>
+            </a:schemeClr>
+          </a:solidFill>
+        </p:spPr>
+        <p:style>
+          <a:lnRef idx="2">
+            <a:schemeClr val="dk1">
+              <a:shade val="50000"/>
+            </a:schemeClr>
+          </a:lnRef>
+          <a:fillRef idx="1">
+            <a:schemeClr val="dk1"/>
+          </a:fillRef>
+          <a:effectRef idx="0">
+            <a:schemeClr val="dk1"/>
+          </a:effectRef>
+          <a:fontRef idx="minor">
+            <a:schemeClr val="lt1"/>
+          </a:fontRef>
+        </p:style>
+        <p:txBody>
+          <a:bodyPr rtlCol="0" anchor="ctr"/>
+          <a:lstStyle/>
+          <a:p>
+            <a:pPr algn="ctr"/>
+            <a:endParaRPr lang="en-US" dirty="0"/>
+          </a:p>
+        </p:txBody>
+      </p:sp>
+      <p:sp>
+        <p:nvSpPr>
+          <p:cNvPr id="8" name="TextBox 7">
+            <a:extLst>
+              <a:ext uri="{FF2B5EF4-FFF2-40B4-BE49-F238E27FC236}">
+                <a16:creationId xmlns:a16="http://schemas.microsoft.com/office/drawing/2014/main" id="{70304249-81FC-4158-8ED4-C404B2448ADB}"/>
+              </a:ext>
+            </a:extLst>
+          </p:cNvPr>
+          <p:cNvSpPr txBox="1"/>
+          <p:nvPr/>
+        </p:nvSpPr>
+        <p:spPr>
+          <a:xfrm>
+            <a:off x="7371200" y="4385338"/>
+            <a:ext cx="4118435" cy="1323439"/>
+          </a:xfrm>
+          <a:prstGeom prst="rect">
+            <a:avLst/>
+          </a:prstGeom>
+          <a:noFill/>
+        </p:spPr>
+        <p:txBody>
+          <a:bodyPr wrap="none" rtlCol="0">
+            <a:spAutoFit/>
+          </a:bodyPr>
+          <a:lstStyle/>
+          <a:p>
+            <a:r>
+              <a:rPr lang="en-US" altLang="zh-CN" sz="8000" dirty="0">
+                <a:solidFill>
+                  <a:srgbClr val="CB41E0"/>
+                </a:solidFill>
+                <a:latin typeface="Arial" panose="020B0604020202020204" pitchFamily="34" charset="0"/>
+                <a:cs typeface="Arial" panose="020B0604020202020204" pitchFamily="34" charset="0"/>
+              </a:rPr>
+              <a:t>Uniswap</a:t>
+            </a:r>
+            <a:endParaRPr lang="en-US" sz="8000" i="1" dirty="0">
+              <a:solidFill>
+                <a:srgbClr val="CB41E0"/>
+              </a:solidFill>
+              <a:latin typeface="Arial" panose="020B0604020202020204" pitchFamily="34" charset="0"/>
+              <a:cs typeface="Arial" panose="020B0604020202020204" pitchFamily="34" charset="0"/>
+            </a:endParaRPr>
+          </a:p>
+        </p:txBody>
+      </p:sp>
+      <p:pic>
+        <p:nvPicPr>
+          <p:cNvPr id="10" name="Picture 9">
+            <a:extLst>
+              <a:ext uri="{FF2B5EF4-FFF2-40B4-BE49-F238E27FC236}">
+                <a16:creationId xmlns:a16="http://schemas.microsoft.com/office/drawing/2014/main" id="{1135B4AC-40B6-471B-835A-BAAAF7E1243B}"/>
+              </a:ext>
+            </a:extLst>
+          </p:cNvPr>
+          <p:cNvPicPr>
+            <a:picLocks noChangeAspect="1"/>
+          </p:cNvPicPr>
+          <p:nvPr/>
+        </p:nvPicPr>
+        <p:blipFill rotWithShape="1">
+          <a:blip r:embed="rId2">
+            <a:extLst>
+              <a:ext uri="{28A0092B-C50C-407E-A947-70E740481C1C}">
+                <a14:useLocalDpi xmlns:a14="http://schemas.microsoft.com/office/drawing/2010/main" val="0"/>
+              </a:ext>
+            </a:extLst>
+          </a:blip>
+          <a:srcRect l="38034" t="19575" r="35939" b="43323"/>
+          <a:stretch/>
+        </p:blipFill>
+        <p:spPr>
+          <a:xfrm>
+            <a:off x="7886700" y="1802069"/>
+            <a:ext cx="2528887" cy="2328863"/>
+          </a:xfrm>
+          <a:prstGeom prst="rect">
+            <a:avLst/>
+          </a:prstGeom>
+        </p:spPr>
+      </p:pic>
+    </p:spTree>
+    <p:extLst>
+      <p:ext uri="{BB962C8B-B14F-4D97-AF65-F5344CB8AC3E}">
+        <p14:creationId xmlns:p14="http://schemas.microsoft.com/office/powerpoint/2010/main" val="2180767997"/>
+      </p:ext>
+    </p:extLst>
+  </p:cSld>
+  <p:clrMapOvr>
+    <a:masterClrMapping/>
+  </p:clrMapOvr>
+</p:sld>
+</file>
+
 <file path=ppt/theme/theme1.xml><?xml version="1.0" encoding="utf-8"?>
 <a:theme xmlns:a="http://schemas.openxmlformats.org/drawingml/2006/main" name="Office Theme">
   <a:themeElements>

</xml_diff>

<commit_message>
Uniswap 3 note 1 update
</commit_message>
<xml_diff>
--- a/assets/images/banners/BannerCreator.pptx
+++ b/assets/images/banners/BannerCreator.pptx
@@ -3833,54 +3833,6 @@
           </a:p>
         </p:txBody>
       </p:sp>
-      <p:sp>
-        <p:nvSpPr>
-          <p:cNvPr id="8" name="TextBox 7">
-            <a:extLst>
-              <a:ext uri="{FF2B5EF4-FFF2-40B4-BE49-F238E27FC236}">
-                <a16:creationId xmlns:a16="http://schemas.microsoft.com/office/drawing/2014/main" id="{70304249-81FC-4158-8ED4-C404B2448ADB}"/>
-              </a:ext>
-            </a:extLst>
-          </p:cNvPr>
-          <p:cNvSpPr txBox="1"/>
-          <p:nvPr/>
-        </p:nvSpPr>
-        <p:spPr>
-          <a:xfrm>
-            <a:off x="7371200" y="4385338"/>
-            <a:ext cx="4118435" cy="1323439"/>
-          </a:xfrm>
-          <a:prstGeom prst="rect">
-            <a:avLst/>
-          </a:prstGeom>
-          <a:noFill/>
-        </p:spPr>
-        <p:txBody>
-          <a:bodyPr wrap="none" rtlCol="0">
-            <a:spAutoFit/>
-          </a:bodyPr>
-          <a:lstStyle/>
-          <a:p>
-            <a:r>
-              <a:rPr lang="en-US" altLang="zh-CN" sz="8000" dirty="0">
-                <a:solidFill>
-                  <a:srgbClr val="CB41E0"/>
-                </a:solidFill>
-                <a:latin typeface="Arial" panose="020B0604020202020204" pitchFamily="34" charset="0"/>
-                <a:cs typeface="Arial" panose="020B0604020202020204" pitchFamily="34" charset="0"/>
-              </a:rPr>
-              <a:t>Uniswap</a:t>
-            </a:r>
-            <a:endParaRPr lang="en-US" sz="8000" i="1" dirty="0">
-              <a:solidFill>
-                <a:srgbClr val="CB41E0"/>
-              </a:solidFill>
-              <a:latin typeface="Arial" panose="020B0604020202020204" pitchFamily="34" charset="0"/>
-              <a:cs typeface="Arial" panose="020B0604020202020204" pitchFamily="34" charset="0"/>
-            </a:endParaRPr>
-          </a:p>
-        </p:txBody>
-      </p:sp>
       <p:pic>
         <p:nvPicPr>
           <p:cNvPr id="10" name="Picture 9">
@@ -3908,7 +3860,7 @@
         </p:blipFill>
         <p:spPr>
           <a:xfrm>
-            <a:off x="7886700" y="1802069"/>
+            <a:off x="7448861" y="1672860"/>
             <a:ext cx="2528887" cy="2328863"/>
           </a:xfrm>
           <a:prstGeom prst="rect">
@@ -3916,6 +3868,116 @@
           </a:prstGeom>
         </p:spPr>
       </p:pic>
+      <p:grpSp>
+        <p:nvGrpSpPr>
+          <p:cNvPr id="4" name="Group 3">
+            <a:extLst>
+              <a:ext uri="{FF2B5EF4-FFF2-40B4-BE49-F238E27FC236}">
+                <a16:creationId xmlns:a16="http://schemas.microsoft.com/office/drawing/2014/main" id="{AF591752-226E-4E0B-9827-462B7A989A2C}"/>
+              </a:ext>
+            </a:extLst>
+          </p:cNvPr>
+          <p:cNvGrpSpPr/>
+          <p:nvPr/>
+        </p:nvGrpSpPr>
+        <p:grpSpPr>
+          <a:xfrm>
+            <a:off x="6096000" y="4345582"/>
+            <a:ext cx="5234609" cy="1323439"/>
+            <a:chOff x="6096000" y="4345582"/>
+            <a:chExt cx="5234609" cy="1323439"/>
+          </a:xfrm>
+        </p:grpSpPr>
+        <p:sp>
+          <p:nvSpPr>
+            <p:cNvPr id="8" name="TextBox 7">
+              <a:extLst>
+                <a:ext uri="{FF2B5EF4-FFF2-40B4-BE49-F238E27FC236}">
+                  <a16:creationId xmlns:a16="http://schemas.microsoft.com/office/drawing/2014/main" id="{70304249-81FC-4158-8ED4-C404B2448ADB}"/>
+                </a:ext>
+              </a:extLst>
+            </p:cNvPr>
+            <p:cNvSpPr txBox="1"/>
+            <p:nvPr/>
+          </p:nvSpPr>
+          <p:spPr>
+            <a:xfrm>
+              <a:off x="7212174" y="4345582"/>
+              <a:ext cx="4118435" cy="1323439"/>
+            </a:xfrm>
+            <a:prstGeom prst="rect">
+              <a:avLst/>
+            </a:prstGeom>
+            <a:noFill/>
+          </p:spPr>
+          <p:txBody>
+            <a:bodyPr wrap="none" rtlCol="0">
+              <a:spAutoFit/>
+            </a:bodyPr>
+            <a:lstStyle/>
+            <a:p>
+              <a:r>
+                <a:rPr lang="en-US" altLang="zh-CN" sz="8000" dirty="0">
+                  <a:solidFill>
+                    <a:srgbClr val="CB41E0"/>
+                  </a:solidFill>
+                  <a:latin typeface="Microsoft YaHei UI Light" panose="020B0502040204020203" pitchFamily="34" charset="-122"/>
+                  <a:ea typeface="Microsoft YaHei UI Light" panose="020B0502040204020203" pitchFamily="34" charset="-122"/>
+                  <a:cs typeface="Arial" panose="020B0604020202020204" pitchFamily="34" charset="0"/>
+                </a:rPr>
+                <a:t>Uniswap</a:t>
+              </a:r>
+              <a:endParaRPr lang="en-US" sz="8000" i="1" dirty="0">
+                <a:solidFill>
+                  <a:srgbClr val="CB41E0"/>
+                </a:solidFill>
+                <a:latin typeface="Microsoft YaHei UI Light" panose="020B0502040204020203" pitchFamily="34" charset="-122"/>
+                <a:ea typeface="Microsoft YaHei UI Light" panose="020B0502040204020203" pitchFamily="34" charset="-122"/>
+                <a:cs typeface="Arial" panose="020B0604020202020204" pitchFamily="34" charset="0"/>
+              </a:endParaRPr>
+            </a:p>
+          </p:txBody>
+        </p:sp>
+        <p:pic>
+          <p:nvPicPr>
+            <p:cNvPr id="3" name="Graphic 2" descr="Transfer with solid fill">
+              <a:extLst>
+                <a:ext uri="{FF2B5EF4-FFF2-40B4-BE49-F238E27FC236}">
+                  <a16:creationId xmlns:a16="http://schemas.microsoft.com/office/drawing/2014/main" id="{51F41EE0-CDC6-47D4-B656-B84BE23E93B3}"/>
+                </a:ext>
+              </a:extLst>
+            </p:cNvPr>
+            <p:cNvPicPr>
+              <a:picLocks noChangeAspect="1"/>
+            </p:cNvPicPr>
+            <p:nvPr/>
+          </p:nvPicPr>
+          <p:blipFill>
+            <a:blip r:embed="rId3">
+              <a:extLst>
+                <a:ext uri="{28A0092B-C50C-407E-A947-70E740481C1C}">
+                  <a14:useLocalDpi xmlns:a14="http://schemas.microsoft.com/office/drawing/2010/main" val="0"/>
+                </a:ext>
+                <a:ext uri="{96DAC541-7B7A-43D3-8B79-37D633B846F1}">
+                  <asvg:svgBlip xmlns:asvg="http://schemas.microsoft.com/office/drawing/2016/SVG/main" r:embed="rId4"/>
+                </a:ext>
+              </a:extLst>
+            </a:blip>
+            <a:stretch>
+              <a:fillRect/>
+            </a:stretch>
+          </p:blipFill>
+          <p:spPr>
+            <a:xfrm>
+              <a:off x="6096000" y="4550101"/>
+              <a:ext cx="914400" cy="914400"/>
+            </a:xfrm>
+            <a:prstGeom prst="rect">
+              <a:avLst/>
+            </a:prstGeom>
+          </p:spPr>
+        </p:pic>
+      </p:grpSp>
     </p:spTree>
     <p:extLst>
       <p:ext uri="{BB962C8B-B14F-4D97-AF65-F5344CB8AC3E}">

</xml_diff>

<commit_message>
Update MAGC Map Log
</commit_message>
<xml_diff>
--- a/assets/images/banners/BannerCreator.pptx
+++ b/assets/images/banners/BannerCreator.pptx
@@ -10,6 +10,7 @@
     <p:sldId id="258" r:id="rId4"/>
     <p:sldId id="259" r:id="rId5"/>
     <p:sldId id="260" r:id="rId6"/>
+    <p:sldId id="262" r:id="rId7"/>
   </p:sldIdLst>
   <p:sldSz cx="12192000" cy="6858000"/>
   <p:notesSz cx="6858000" cy="9144000"/>
@@ -324,7 +325,7 @@
           <a:p>
             <a:fld id="{BD8AEB8B-F03B-4148-B37B-28C602FB6DA0}" type="datetimeFigureOut">
               <a:rPr lang="en-US" smtClean="0"/>
-              <a:t>9/27/21</a:t>
+              <a:t>10/7/21</a:t>
             </a:fld>
             <a:endParaRPr lang="en-US"/>
           </a:p>
@@ -522,7 +523,7 @@
           <a:p>
             <a:fld id="{BD8AEB8B-F03B-4148-B37B-28C602FB6DA0}" type="datetimeFigureOut">
               <a:rPr lang="en-US" smtClean="0"/>
-              <a:t>9/27/21</a:t>
+              <a:t>10/7/21</a:t>
             </a:fld>
             <a:endParaRPr lang="en-US"/>
           </a:p>
@@ -730,7 +731,7 @@
           <a:p>
             <a:fld id="{BD8AEB8B-F03B-4148-B37B-28C602FB6DA0}" type="datetimeFigureOut">
               <a:rPr lang="en-US" smtClean="0"/>
-              <a:t>9/27/21</a:t>
+              <a:t>10/7/21</a:t>
             </a:fld>
             <a:endParaRPr lang="en-US"/>
           </a:p>
@@ -928,7 +929,7 @@
           <a:p>
             <a:fld id="{BD8AEB8B-F03B-4148-B37B-28C602FB6DA0}" type="datetimeFigureOut">
               <a:rPr lang="en-US" smtClean="0"/>
-              <a:t>9/27/21</a:t>
+              <a:t>10/7/21</a:t>
             </a:fld>
             <a:endParaRPr lang="en-US"/>
           </a:p>
@@ -1203,7 +1204,7 @@
           <a:p>
             <a:fld id="{BD8AEB8B-F03B-4148-B37B-28C602FB6DA0}" type="datetimeFigureOut">
               <a:rPr lang="en-US" smtClean="0"/>
-              <a:t>9/27/21</a:t>
+              <a:t>10/7/21</a:t>
             </a:fld>
             <a:endParaRPr lang="en-US"/>
           </a:p>
@@ -1468,7 +1469,7 @@
           <a:p>
             <a:fld id="{BD8AEB8B-F03B-4148-B37B-28C602FB6DA0}" type="datetimeFigureOut">
               <a:rPr lang="en-US" smtClean="0"/>
-              <a:t>9/27/21</a:t>
+              <a:t>10/7/21</a:t>
             </a:fld>
             <a:endParaRPr lang="en-US"/>
           </a:p>
@@ -1880,7 +1881,7 @@
           <a:p>
             <a:fld id="{BD8AEB8B-F03B-4148-B37B-28C602FB6DA0}" type="datetimeFigureOut">
               <a:rPr lang="en-US" smtClean="0"/>
-              <a:t>9/27/21</a:t>
+              <a:t>10/7/21</a:t>
             </a:fld>
             <a:endParaRPr lang="en-US"/>
           </a:p>
@@ -2021,7 +2022,7 @@
           <a:p>
             <a:fld id="{BD8AEB8B-F03B-4148-B37B-28C602FB6DA0}" type="datetimeFigureOut">
               <a:rPr lang="en-US" smtClean="0"/>
-              <a:t>9/27/21</a:t>
+              <a:t>10/7/21</a:t>
             </a:fld>
             <a:endParaRPr lang="en-US"/>
           </a:p>
@@ -2134,7 +2135,7 @@
           <a:p>
             <a:fld id="{BD8AEB8B-F03B-4148-B37B-28C602FB6DA0}" type="datetimeFigureOut">
               <a:rPr lang="en-US" smtClean="0"/>
-              <a:t>9/27/21</a:t>
+              <a:t>10/7/21</a:t>
             </a:fld>
             <a:endParaRPr lang="en-US"/>
           </a:p>
@@ -2445,7 +2446,7 @@
           <a:p>
             <a:fld id="{BD8AEB8B-F03B-4148-B37B-28C602FB6DA0}" type="datetimeFigureOut">
               <a:rPr lang="en-US" smtClean="0"/>
-              <a:t>9/27/21</a:t>
+              <a:t>10/7/21</a:t>
             </a:fld>
             <a:endParaRPr lang="en-US"/>
           </a:p>
@@ -2733,7 +2734,7 @@
           <a:p>
             <a:fld id="{BD8AEB8B-F03B-4148-B37B-28C602FB6DA0}" type="datetimeFigureOut">
               <a:rPr lang="en-US" smtClean="0"/>
-              <a:t>9/27/21</a:t>
+              <a:t>10/7/21</a:t>
             </a:fld>
             <a:endParaRPr lang="en-US"/>
           </a:p>
@@ -2974,7 +2975,7 @@
           <a:p>
             <a:fld id="{BD8AEB8B-F03B-4148-B37B-28C602FB6DA0}" type="datetimeFigureOut">
               <a:rPr lang="en-US" smtClean="0"/>
-              <a:t>9/27/21</a:t>
+              <a:t>10/7/21</a:t>
             </a:fld>
             <a:endParaRPr lang="en-US"/>
           </a:p>
@@ -4121,6 +4122,132 @@
 </p:sld>
 </file>
 
+<file path=ppt/slides/slide6.xml><?xml version="1.0" encoding="utf-8"?>
+<p:sld xmlns:a="http://schemas.openxmlformats.org/drawingml/2006/main" xmlns:r="http://schemas.openxmlformats.org/officeDocument/2006/relationships" xmlns:p="http://schemas.openxmlformats.org/presentationml/2006/main">
+  <p:cSld>
+    <p:spTree>
+      <p:nvGrpSpPr>
+        <p:cNvPr id="1" name=""/>
+        <p:cNvGrpSpPr/>
+        <p:nvPr/>
+      </p:nvGrpSpPr>
+      <p:grpSpPr>
+        <a:xfrm>
+          <a:off x="0" y="0"/>
+          <a:ext cx="0" cy="0"/>
+          <a:chOff x="0" y="0"/>
+          <a:chExt cx="0" cy="0"/>
+        </a:xfrm>
+      </p:grpSpPr>
+      <p:sp>
+        <p:nvSpPr>
+          <p:cNvPr id="6" name="Rectangle 5">
+            <a:extLst>
+              <a:ext uri="{FF2B5EF4-FFF2-40B4-BE49-F238E27FC236}">
+                <a16:creationId xmlns:a16="http://schemas.microsoft.com/office/drawing/2014/main" id="{0439AF00-8634-4701-946F-B6029D9D9A9D}"/>
+              </a:ext>
+            </a:extLst>
+          </p:cNvPr>
+          <p:cNvSpPr/>
+          <p:nvPr/>
+        </p:nvSpPr>
+        <p:spPr>
+          <a:xfrm>
+            <a:off x="0" y="0"/>
+            <a:ext cx="12192000" cy="6858000"/>
+          </a:xfrm>
+          <a:prstGeom prst="rect">
+            <a:avLst/>
+          </a:prstGeom>
+          <a:solidFill>
+            <a:schemeClr val="tx1">
+              <a:lumMod val="85000"/>
+              <a:lumOff val="15000"/>
+            </a:schemeClr>
+          </a:solidFill>
+        </p:spPr>
+        <p:style>
+          <a:lnRef idx="2">
+            <a:schemeClr val="dk1">
+              <a:shade val="50000"/>
+            </a:schemeClr>
+          </a:lnRef>
+          <a:fillRef idx="1">
+            <a:schemeClr val="dk1"/>
+          </a:fillRef>
+          <a:effectRef idx="0">
+            <a:schemeClr val="dk1"/>
+          </a:effectRef>
+          <a:fontRef idx="minor">
+            <a:schemeClr val="lt1"/>
+          </a:fontRef>
+        </p:style>
+        <p:txBody>
+          <a:bodyPr rtlCol="0" anchor="ctr"/>
+          <a:lstStyle/>
+          <a:p>
+            <a:pPr algn="ctr"/>
+            <a:endParaRPr lang="en-US" dirty="0"/>
+          </a:p>
+        </p:txBody>
+      </p:sp>
+      <p:pic>
+        <p:nvPicPr>
+          <p:cNvPr id="3" name="Picture 2" descr="A blue and white logo&#10;&#10;Description automatically generated with low confidence">
+            <a:extLst>
+              <a:ext uri="{FF2B5EF4-FFF2-40B4-BE49-F238E27FC236}">
+                <a16:creationId xmlns:a16="http://schemas.microsoft.com/office/drawing/2014/main" id="{53150B03-5C54-1E45-8352-892B29E38B23}"/>
+              </a:ext>
+            </a:extLst>
+          </p:cNvPr>
+          <p:cNvPicPr>
+            <a:picLocks noChangeAspect="1"/>
+          </p:cNvPicPr>
+          <p:nvPr/>
+        </p:nvPicPr>
+        <p:blipFill rotWithShape="1">
+          <a:blip r:embed="rId2">
+            <a:extLst>
+              <a:ext uri="{BEBA8EAE-BF5A-486C-A8C5-ECC9F3942E4B}">
+                <a14:imgProps xmlns:a14="http://schemas.microsoft.com/office/drawing/2010/main">
+                  <a14:imgLayer r:embed="rId3">
+                    <a14:imgEffect>
+                      <a14:backgroundRemoval t="10000" b="90000" l="10000" r="90000"/>
+                    </a14:imgEffect>
+                  </a14:imgLayer>
+                </a14:imgProps>
+              </a:ext>
+              <a:ext uri="{28A0092B-C50C-407E-A947-70E740481C1C}">
+                <a14:useLocalDpi xmlns:a14="http://schemas.microsoft.com/office/drawing/2010/main" val="0"/>
+              </a:ext>
+            </a:extLst>
+          </a:blip>
+          <a:srcRect l="33702" r="34969"/>
+          <a:stretch/>
+        </p:blipFill>
+        <p:spPr>
+          <a:xfrm>
+            <a:off x="7720314" y="994351"/>
+            <a:ext cx="3819645" cy="3989622"/>
+          </a:xfrm>
+          <a:prstGeom prst="rect">
+            <a:avLst/>
+          </a:prstGeom>
+        </p:spPr>
+      </p:pic>
+    </p:spTree>
+    <p:extLst>
+      <p:ext uri="{BB962C8B-B14F-4D97-AF65-F5344CB8AC3E}">
+        <p14:creationId xmlns:p14="http://schemas.microsoft.com/office/powerpoint/2010/main" val="2829390769"/>
+      </p:ext>
+    </p:extLst>
+  </p:cSld>
+  <p:clrMapOvr>
+    <a:masterClrMapping/>
+  </p:clrMapOvr>
+</p:sld>
+</file>
+
 <file path=ppt/theme/theme1.xml><?xml version="1.0" encoding="utf-8"?>
 <a:theme xmlns:a="http://schemas.openxmlformats.org/drawingml/2006/main" name="Office Theme">
   <a:themeElements>

</xml_diff>

<commit_message>
Update File Sharing System
</commit_message>
<xml_diff>
--- a/assets/images/banners/BannerCreator.pptx
+++ b/assets/images/banners/BannerCreator.pptx
@@ -11,6 +11,7 @@
     <p:sldId id="259" r:id="rId5"/>
     <p:sldId id="260" r:id="rId6"/>
     <p:sldId id="262" r:id="rId7"/>
+    <p:sldId id="263" r:id="rId8"/>
   </p:sldIdLst>
   <p:sldSz cx="12192000" cy="6858000"/>
   <p:notesSz cx="6858000" cy="9144000"/>
@@ -325,7 +326,7 @@
           <a:p>
             <a:fld id="{BD8AEB8B-F03B-4148-B37B-28C602FB6DA0}" type="datetimeFigureOut">
               <a:rPr lang="en-US" smtClean="0"/>
-              <a:t>10/7/21</a:t>
+              <a:t>1/19/2022</a:t>
             </a:fld>
             <a:endParaRPr lang="en-US"/>
           </a:p>
@@ -523,7 +524,7 @@
           <a:p>
             <a:fld id="{BD8AEB8B-F03B-4148-B37B-28C602FB6DA0}" type="datetimeFigureOut">
               <a:rPr lang="en-US" smtClean="0"/>
-              <a:t>10/7/21</a:t>
+              <a:t>1/19/2022</a:t>
             </a:fld>
             <a:endParaRPr lang="en-US"/>
           </a:p>
@@ -731,7 +732,7 @@
           <a:p>
             <a:fld id="{BD8AEB8B-F03B-4148-B37B-28C602FB6DA0}" type="datetimeFigureOut">
               <a:rPr lang="en-US" smtClean="0"/>
-              <a:t>10/7/21</a:t>
+              <a:t>1/19/2022</a:t>
             </a:fld>
             <a:endParaRPr lang="en-US"/>
           </a:p>
@@ -929,7 +930,7 @@
           <a:p>
             <a:fld id="{BD8AEB8B-F03B-4148-B37B-28C602FB6DA0}" type="datetimeFigureOut">
               <a:rPr lang="en-US" smtClean="0"/>
-              <a:t>10/7/21</a:t>
+              <a:t>1/19/2022</a:t>
             </a:fld>
             <a:endParaRPr lang="en-US"/>
           </a:p>
@@ -1204,7 +1205,7 @@
           <a:p>
             <a:fld id="{BD8AEB8B-F03B-4148-B37B-28C602FB6DA0}" type="datetimeFigureOut">
               <a:rPr lang="en-US" smtClean="0"/>
-              <a:t>10/7/21</a:t>
+              <a:t>1/19/2022</a:t>
             </a:fld>
             <a:endParaRPr lang="en-US"/>
           </a:p>
@@ -1469,7 +1470,7 @@
           <a:p>
             <a:fld id="{BD8AEB8B-F03B-4148-B37B-28C602FB6DA0}" type="datetimeFigureOut">
               <a:rPr lang="en-US" smtClean="0"/>
-              <a:t>10/7/21</a:t>
+              <a:t>1/19/2022</a:t>
             </a:fld>
             <a:endParaRPr lang="en-US"/>
           </a:p>
@@ -1881,7 +1882,7 @@
           <a:p>
             <a:fld id="{BD8AEB8B-F03B-4148-B37B-28C602FB6DA0}" type="datetimeFigureOut">
               <a:rPr lang="en-US" smtClean="0"/>
-              <a:t>10/7/21</a:t>
+              <a:t>1/19/2022</a:t>
             </a:fld>
             <a:endParaRPr lang="en-US"/>
           </a:p>
@@ -2022,7 +2023,7 @@
           <a:p>
             <a:fld id="{BD8AEB8B-F03B-4148-B37B-28C602FB6DA0}" type="datetimeFigureOut">
               <a:rPr lang="en-US" smtClean="0"/>
-              <a:t>10/7/21</a:t>
+              <a:t>1/19/2022</a:t>
             </a:fld>
             <a:endParaRPr lang="en-US"/>
           </a:p>
@@ -2135,7 +2136,7 @@
           <a:p>
             <a:fld id="{BD8AEB8B-F03B-4148-B37B-28C602FB6DA0}" type="datetimeFigureOut">
               <a:rPr lang="en-US" smtClean="0"/>
-              <a:t>10/7/21</a:t>
+              <a:t>1/19/2022</a:t>
             </a:fld>
             <a:endParaRPr lang="en-US"/>
           </a:p>
@@ -2446,7 +2447,7 @@
           <a:p>
             <a:fld id="{BD8AEB8B-F03B-4148-B37B-28C602FB6DA0}" type="datetimeFigureOut">
               <a:rPr lang="en-US" smtClean="0"/>
-              <a:t>10/7/21</a:t>
+              <a:t>1/19/2022</a:t>
             </a:fld>
             <a:endParaRPr lang="en-US"/>
           </a:p>
@@ -2734,7 +2735,7 @@
           <a:p>
             <a:fld id="{BD8AEB8B-F03B-4148-B37B-28C602FB6DA0}" type="datetimeFigureOut">
               <a:rPr lang="en-US" smtClean="0"/>
-              <a:t>10/7/21</a:t>
+              <a:t>1/19/2022</a:t>
             </a:fld>
             <a:endParaRPr lang="en-US"/>
           </a:p>
@@ -2975,7 +2976,7 @@
           <a:p>
             <a:fld id="{BD8AEB8B-F03B-4148-B37B-28C602FB6DA0}" type="datetimeFigureOut">
               <a:rPr lang="en-US" smtClean="0"/>
-              <a:t>10/7/21</a:t>
+              <a:t>1/19/2022</a:t>
             </a:fld>
             <a:endParaRPr lang="en-US"/>
           </a:p>
@@ -4248,6 +4249,1942 @@
 </p:sld>
 </file>
 
+<file path=ppt/slides/slide7.xml><?xml version="1.0" encoding="utf-8"?>
+<p:sld xmlns:a="http://schemas.openxmlformats.org/drawingml/2006/main" xmlns:r="http://schemas.openxmlformats.org/officeDocument/2006/relationships" xmlns:p="http://schemas.openxmlformats.org/presentationml/2006/main">
+  <p:cSld>
+    <p:spTree>
+      <p:nvGrpSpPr>
+        <p:cNvPr id="1" name=""/>
+        <p:cNvGrpSpPr/>
+        <p:nvPr/>
+      </p:nvGrpSpPr>
+      <p:grpSpPr>
+        <a:xfrm>
+          <a:off x="0" y="0"/>
+          <a:ext cx="0" cy="0"/>
+          <a:chOff x="0" y="0"/>
+          <a:chExt cx="0" cy="0"/>
+        </a:xfrm>
+      </p:grpSpPr>
+      <p:sp>
+        <p:nvSpPr>
+          <p:cNvPr id="6" name="Rectangle 5">
+            <a:extLst>
+              <a:ext uri="{FF2B5EF4-FFF2-40B4-BE49-F238E27FC236}">
+                <a16:creationId xmlns:a16="http://schemas.microsoft.com/office/drawing/2014/main" id="{0439AF00-8634-4701-946F-B6029D9D9A9D}"/>
+              </a:ext>
+            </a:extLst>
+          </p:cNvPr>
+          <p:cNvSpPr/>
+          <p:nvPr/>
+        </p:nvSpPr>
+        <p:spPr>
+          <a:xfrm>
+            <a:off x="0" y="0"/>
+            <a:ext cx="12192000" cy="6858000"/>
+          </a:xfrm>
+          <a:prstGeom prst="rect">
+            <a:avLst/>
+          </a:prstGeom>
+          <a:solidFill>
+            <a:schemeClr val="tx1">
+              <a:lumMod val="85000"/>
+              <a:lumOff val="15000"/>
+            </a:schemeClr>
+          </a:solidFill>
+        </p:spPr>
+        <p:style>
+          <a:lnRef idx="2">
+            <a:schemeClr val="dk1">
+              <a:shade val="50000"/>
+            </a:schemeClr>
+          </a:lnRef>
+          <a:fillRef idx="1">
+            <a:schemeClr val="dk1"/>
+          </a:fillRef>
+          <a:effectRef idx="0">
+            <a:schemeClr val="dk1"/>
+          </a:effectRef>
+          <a:fontRef idx="minor">
+            <a:schemeClr val="lt1"/>
+          </a:fontRef>
+        </p:style>
+        <p:txBody>
+          <a:bodyPr rtlCol="0" anchor="ctr"/>
+          <a:lstStyle/>
+          <a:p>
+            <a:pPr algn="ctr"/>
+            <a:endParaRPr lang="en-US" dirty="0"/>
+          </a:p>
+        </p:txBody>
+      </p:sp>
+      <p:grpSp>
+        <p:nvGrpSpPr>
+          <p:cNvPr id="2" name="Group 1">
+            <a:extLst>
+              <a:ext uri="{FF2B5EF4-FFF2-40B4-BE49-F238E27FC236}">
+                <a16:creationId xmlns:a16="http://schemas.microsoft.com/office/drawing/2014/main" id="{A12216A0-3226-4061-8992-F5AF3337CFAA}"/>
+              </a:ext>
+            </a:extLst>
+          </p:cNvPr>
+          <p:cNvGrpSpPr/>
+          <p:nvPr/>
+        </p:nvGrpSpPr>
+        <p:grpSpPr>
+          <a:xfrm>
+            <a:off x="3121597" y="3336274"/>
+            <a:ext cx="2292350" cy="1069777"/>
+            <a:chOff x="5035117" y="3040784"/>
+            <a:chExt cx="2292350" cy="1069777"/>
+          </a:xfrm>
+        </p:grpSpPr>
+        <p:pic>
+          <p:nvPicPr>
+            <p:cNvPr id="4" name="Graphic 17">
+              <a:extLst>
+                <a:ext uri="{FF2B5EF4-FFF2-40B4-BE49-F238E27FC236}">
+                  <a16:creationId xmlns:a16="http://schemas.microsoft.com/office/drawing/2014/main" id="{4F5C9110-90FD-4F60-8751-2E4420C55B78}"/>
+                </a:ext>
+              </a:extLst>
+            </p:cNvPr>
+            <p:cNvPicPr>
+              <a:picLocks noChangeAspect="1" noChangeArrowheads="1"/>
+            </p:cNvPicPr>
+            <p:nvPr/>
+          </p:nvPicPr>
+          <p:blipFill>
+            <a:blip r:embed="rId2">
+              <a:extLst>
+                <a:ext uri="{28A0092B-C50C-407E-A947-70E740481C1C}">
+                  <a14:useLocalDpi xmlns:a14="http://schemas.microsoft.com/office/drawing/2010/main" val="0"/>
+                </a:ext>
+              </a:extLst>
+            </a:blip>
+            <a:srcRect/>
+            <a:stretch>
+              <a:fillRect/>
+            </a:stretch>
+          </p:blipFill>
+          <p:spPr bwMode="auto">
+            <a:xfrm>
+              <a:off x="5800292" y="3040784"/>
+              <a:ext cx="762000" cy="762000"/>
+            </a:xfrm>
+            <a:prstGeom prst="rect">
+              <a:avLst/>
+            </a:prstGeom>
+            <a:noFill/>
+            <a:ln>
+              <a:noFill/>
+            </a:ln>
+            <a:extLst>
+              <a:ext uri="{909E8E84-426E-40DD-AFC4-6F175D3DCCD1}">
+                <a14:hiddenFill xmlns:a14="http://schemas.microsoft.com/office/drawing/2010/main">
+                  <a:solidFill>
+                    <a:srgbClr val="FFFFFF"/>
+                  </a:solidFill>
+                </a14:hiddenFill>
+              </a:ext>
+              <a:ext uri="{91240B29-F687-4F45-9708-019B960494DF}">
+                <a14:hiddenLine xmlns:a14="http://schemas.microsoft.com/office/drawing/2010/main" w="9525">
+                  <a:solidFill>
+                    <a:srgbClr val="000000"/>
+                  </a:solidFill>
+                  <a:miter lim="800000"/>
+                  <a:headEnd/>
+                  <a:tailEnd/>
+                </a14:hiddenLine>
+              </a:ext>
+            </a:extLst>
+          </p:spPr>
+        </p:pic>
+        <p:sp>
+          <p:nvSpPr>
+            <p:cNvPr id="5" name="TextBox 11">
+              <a:extLst>
+                <a:ext uri="{FF2B5EF4-FFF2-40B4-BE49-F238E27FC236}">
+                  <a16:creationId xmlns:a16="http://schemas.microsoft.com/office/drawing/2014/main" id="{B0287B96-EFCC-4413-887C-36B236A634EE}"/>
+                </a:ext>
+              </a:extLst>
+            </p:cNvPr>
+            <p:cNvSpPr txBox="1">
+              <a:spLocks noChangeArrowheads="1"/>
+            </p:cNvSpPr>
+            <p:nvPr/>
+          </p:nvSpPr>
+          <p:spPr bwMode="auto">
+            <a:xfrm>
+              <a:off x="5035117" y="3802784"/>
+              <a:ext cx="2292350" cy="307777"/>
+            </a:xfrm>
+            <a:prstGeom prst="rect">
+              <a:avLst/>
+            </a:prstGeom>
+            <a:noFill/>
+            <a:ln>
+              <a:noFill/>
+            </a:ln>
+            <a:extLst>
+              <a:ext uri="{909E8E84-426E-40DD-AFC4-6F175D3DCCD1}">
+                <a14:hiddenFill xmlns:a14="http://schemas.microsoft.com/office/drawing/2010/main">
+                  <a:solidFill>
+                    <a:srgbClr val="FFFFFF"/>
+                  </a:solidFill>
+                </a14:hiddenFill>
+              </a:ext>
+              <a:ext uri="{91240B29-F687-4F45-9708-019B960494DF}">
+                <a14:hiddenLine xmlns:a14="http://schemas.microsoft.com/office/drawing/2010/main" w="9525">
+                  <a:solidFill>
+                    <a:srgbClr val="000000"/>
+                  </a:solidFill>
+                  <a:miter lim="800000"/>
+                  <a:headEnd/>
+                  <a:tailEnd/>
+                </a14:hiddenLine>
+              </a:ext>
+            </a:extLst>
+          </p:spPr>
+          <p:txBody>
+            <a:bodyPr>
+              <a:spAutoFit/>
+            </a:bodyPr>
+            <a:lstStyle>
+              <a:lvl1pPr>
+                <a:defRPr>
+                  <a:solidFill>
+                    <a:schemeClr val="tx1"/>
+                  </a:solidFill>
+                  <a:latin typeface="Calibri" panose="020F0502020204030204" pitchFamily="34" charset="0"/>
+                </a:defRPr>
+              </a:lvl1pPr>
+              <a:lvl2pPr marL="742950" indent="-285750">
+                <a:defRPr>
+                  <a:solidFill>
+                    <a:schemeClr val="tx1"/>
+                  </a:solidFill>
+                  <a:latin typeface="Calibri" panose="020F0502020204030204" pitchFamily="34" charset="0"/>
+                </a:defRPr>
+              </a:lvl2pPr>
+              <a:lvl3pPr marL="1143000" indent="-228600">
+                <a:defRPr>
+                  <a:solidFill>
+                    <a:schemeClr val="tx1"/>
+                  </a:solidFill>
+                  <a:latin typeface="Calibri" panose="020F0502020204030204" pitchFamily="34" charset="0"/>
+                </a:defRPr>
+              </a:lvl3pPr>
+              <a:lvl4pPr marL="1600200" indent="-228600">
+                <a:defRPr>
+                  <a:solidFill>
+                    <a:schemeClr val="tx1"/>
+                  </a:solidFill>
+                  <a:latin typeface="Calibri" panose="020F0502020204030204" pitchFamily="34" charset="0"/>
+                </a:defRPr>
+              </a:lvl4pPr>
+              <a:lvl5pPr marL="2057400" indent="-228600">
+                <a:defRPr>
+                  <a:solidFill>
+                    <a:schemeClr val="tx1"/>
+                  </a:solidFill>
+                  <a:latin typeface="Calibri" panose="020F0502020204030204" pitchFamily="34" charset="0"/>
+                </a:defRPr>
+              </a:lvl5pPr>
+              <a:lvl6pPr marL="2514600" indent="-228600" eaLnBrk="0" fontAlgn="base" hangingPunct="0">
+                <a:spcBef>
+                  <a:spcPct val="0"/>
+                </a:spcBef>
+                <a:spcAft>
+                  <a:spcPct val="0"/>
+                </a:spcAft>
+                <a:defRPr>
+                  <a:solidFill>
+                    <a:schemeClr val="tx1"/>
+                  </a:solidFill>
+                  <a:latin typeface="Calibri" panose="020F0502020204030204" pitchFamily="34" charset="0"/>
+                </a:defRPr>
+              </a:lvl6pPr>
+              <a:lvl7pPr marL="2971800" indent="-228600" eaLnBrk="0" fontAlgn="base" hangingPunct="0">
+                <a:spcBef>
+                  <a:spcPct val="0"/>
+                </a:spcBef>
+                <a:spcAft>
+                  <a:spcPct val="0"/>
+                </a:spcAft>
+                <a:defRPr>
+                  <a:solidFill>
+                    <a:schemeClr val="tx1"/>
+                  </a:solidFill>
+                  <a:latin typeface="Calibri" panose="020F0502020204030204" pitchFamily="34" charset="0"/>
+                </a:defRPr>
+              </a:lvl7pPr>
+              <a:lvl8pPr marL="3429000" indent="-228600" eaLnBrk="0" fontAlgn="base" hangingPunct="0">
+                <a:spcBef>
+                  <a:spcPct val="0"/>
+                </a:spcBef>
+                <a:spcAft>
+                  <a:spcPct val="0"/>
+                </a:spcAft>
+                <a:defRPr>
+                  <a:solidFill>
+                    <a:schemeClr val="tx1"/>
+                  </a:solidFill>
+                  <a:latin typeface="Calibri" panose="020F0502020204030204" pitchFamily="34" charset="0"/>
+                </a:defRPr>
+              </a:lvl8pPr>
+              <a:lvl9pPr marL="3886200" indent="-228600" eaLnBrk="0" fontAlgn="base" hangingPunct="0">
+                <a:spcBef>
+                  <a:spcPct val="0"/>
+                </a:spcBef>
+                <a:spcAft>
+                  <a:spcPct val="0"/>
+                </a:spcAft>
+                <a:defRPr>
+                  <a:solidFill>
+                    <a:schemeClr val="tx1"/>
+                  </a:solidFill>
+                  <a:latin typeface="Calibri" panose="020F0502020204030204" pitchFamily="34" charset="0"/>
+                </a:defRPr>
+              </a:lvl9pPr>
+            </a:lstStyle>
+            <a:p>
+              <a:pPr algn="ctr" eaLnBrk="1" hangingPunct="1"/>
+              <a:r>
+                <a:rPr lang="en-US" altLang="en-US" sz="1400" dirty="0">
+                  <a:solidFill>
+                    <a:schemeClr val="bg2"/>
+                  </a:solidFill>
+                  <a:latin typeface="Arial" panose="020B0604020202020204" pitchFamily="34" charset="0"/>
+                  <a:ea typeface="Amazon Ember" panose="020B0603020204020204" pitchFamily="34" charset="0"/>
+                  <a:cs typeface="Arial" panose="020B0604020202020204" pitchFamily="34" charset="0"/>
+                </a:rPr>
+                <a:t>Amazon Cognito</a:t>
+              </a:r>
+            </a:p>
+          </p:txBody>
+        </p:sp>
+      </p:grpSp>
+      <p:grpSp>
+        <p:nvGrpSpPr>
+          <p:cNvPr id="9" name="Group 8">
+            <a:extLst>
+              <a:ext uri="{FF2B5EF4-FFF2-40B4-BE49-F238E27FC236}">
+                <a16:creationId xmlns:a16="http://schemas.microsoft.com/office/drawing/2014/main" id="{57B57E15-5836-4085-9166-92B273308DE7}"/>
+              </a:ext>
+            </a:extLst>
+          </p:cNvPr>
+          <p:cNvGrpSpPr/>
+          <p:nvPr/>
+        </p:nvGrpSpPr>
+        <p:grpSpPr>
+          <a:xfrm>
+            <a:off x="9282396" y="3227758"/>
+            <a:ext cx="2239962" cy="1286809"/>
+            <a:chOff x="8639752" y="3039195"/>
+            <a:chExt cx="2239962" cy="1286809"/>
+          </a:xfrm>
+        </p:grpSpPr>
+        <p:pic>
+          <p:nvPicPr>
+            <p:cNvPr id="7" name="Graphic 8">
+              <a:extLst>
+                <a:ext uri="{FF2B5EF4-FFF2-40B4-BE49-F238E27FC236}">
+                  <a16:creationId xmlns:a16="http://schemas.microsoft.com/office/drawing/2014/main" id="{174A5DAC-E14D-40ED-8817-5D37C34DCF4E}"/>
+                </a:ext>
+              </a:extLst>
+            </p:cNvPr>
+            <p:cNvPicPr>
+              <a:picLocks noChangeAspect="1" noChangeArrowheads="1"/>
+            </p:cNvPicPr>
+            <p:nvPr/>
+          </p:nvPicPr>
+          <p:blipFill>
+            <a:blip r:embed="rId3">
+              <a:extLst>
+                <a:ext uri="{28A0092B-C50C-407E-A947-70E740481C1C}">
+                  <a14:useLocalDpi xmlns:a14="http://schemas.microsoft.com/office/drawing/2010/main" val="0"/>
+                </a:ext>
+              </a:extLst>
+            </a:blip>
+            <a:srcRect/>
+            <a:stretch>
+              <a:fillRect/>
+            </a:stretch>
+          </p:blipFill>
+          <p:spPr bwMode="auto">
+            <a:xfrm>
+              <a:off x="9378733" y="3039195"/>
+              <a:ext cx="762000" cy="762000"/>
+            </a:xfrm>
+            <a:prstGeom prst="rect">
+              <a:avLst/>
+            </a:prstGeom>
+            <a:noFill/>
+            <a:ln>
+              <a:noFill/>
+            </a:ln>
+            <a:extLst>
+              <a:ext uri="{909E8E84-426E-40DD-AFC4-6F175D3DCCD1}">
+                <a14:hiddenFill xmlns:a14="http://schemas.microsoft.com/office/drawing/2010/main">
+                  <a:solidFill>
+                    <a:srgbClr val="FFFFFF"/>
+                  </a:solidFill>
+                </a14:hiddenFill>
+              </a:ext>
+              <a:ext uri="{91240B29-F687-4F45-9708-019B960494DF}">
+                <a14:hiddenLine xmlns:a14="http://schemas.microsoft.com/office/drawing/2010/main" w="9525">
+                  <a:solidFill>
+                    <a:srgbClr val="000000"/>
+                  </a:solidFill>
+                  <a:miter lim="800000"/>
+                  <a:headEnd/>
+                  <a:tailEnd/>
+                </a14:hiddenLine>
+              </a:ext>
+            </a:extLst>
+          </p:spPr>
+        </p:pic>
+        <p:sp>
+          <p:nvSpPr>
+            <p:cNvPr id="8" name="TextBox 9">
+              <a:extLst>
+                <a:ext uri="{FF2B5EF4-FFF2-40B4-BE49-F238E27FC236}">
+                  <a16:creationId xmlns:a16="http://schemas.microsoft.com/office/drawing/2014/main" id="{B1908628-6A20-4C51-BBA7-5DE7DF68437E}"/>
+                </a:ext>
+              </a:extLst>
+            </p:cNvPr>
+            <p:cNvSpPr txBox="1">
+              <a:spLocks noChangeArrowheads="1"/>
+            </p:cNvSpPr>
+            <p:nvPr/>
+          </p:nvSpPr>
+          <p:spPr bwMode="auto">
+            <a:xfrm>
+              <a:off x="8639752" y="3802784"/>
+              <a:ext cx="2239962" cy="523220"/>
+            </a:xfrm>
+            <a:prstGeom prst="rect">
+              <a:avLst/>
+            </a:prstGeom>
+            <a:noFill/>
+            <a:ln>
+              <a:noFill/>
+            </a:ln>
+            <a:extLst>
+              <a:ext uri="{909E8E84-426E-40DD-AFC4-6F175D3DCCD1}">
+                <a14:hiddenFill xmlns:a14="http://schemas.microsoft.com/office/drawing/2010/main">
+                  <a:solidFill>
+                    <a:srgbClr val="FFFFFF"/>
+                  </a:solidFill>
+                </a14:hiddenFill>
+              </a:ext>
+              <a:ext uri="{91240B29-F687-4F45-9708-019B960494DF}">
+                <a14:hiddenLine xmlns:a14="http://schemas.microsoft.com/office/drawing/2010/main" w="9525">
+                  <a:solidFill>
+                    <a:srgbClr val="000000"/>
+                  </a:solidFill>
+                  <a:miter lim="800000"/>
+                  <a:headEnd/>
+                  <a:tailEnd/>
+                </a14:hiddenLine>
+              </a:ext>
+            </a:extLst>
+          </p:spPr>
+          <p:txBody>
+            <a:bodyPr>
+              <a:spAutoFit/>
+            </a:bodyPr>
+            <a:lstStyle>
+              <a:lvl1pPr>
+                <a:defRPr>
+                  <a:solidFill>
+                    <a:schemeClr val="tx1"/>
+                  </a:solidFill>
+                  <a:latin typeface="Calibri" panose="020F0502020204030204" pitchFamily="34" charset="0"/>
+                </a:defRPr>
+              </a:lvl1pPr>
+              <a:lvl2pPr marL="742950" indent="-285750">
+                <a:defRPr>
+                  <a:solidFill>
+                    <a:schemeClr val="tx1"/>
+                  </a:solidFill>
+                  <a:latin typeface="Calibri" panose="020F0502020204030204" pitchFamily="34" charset="0"/>
+                </a:defRPr>
+              </a:lvl2pPr>
+              <a:lvl3pPr marL="1143000" indent="-228600">
+                <a:defRPr>
+                  <a:solidFill>
+                    <a:schemeClr val="tx1"/>
+                  </a:solidFill>
+                  <a:latin typeface="Calibri" panose="020F0502020204030204" pitchFamily="34" charset="0"/>
+                </a:defRPr>
+              </a:lvl3pPr>
+              <a:lvl4pPr marL="1600200" indent="-228600">
+                <a:defRPr>
+                  <a:solidFill>
+                    <a:schemeClr val="tx1"/>
+                  </a:solidFill>
+                  <a:latin typeface="Calibri" panose="020F0502020204030204" pitchFamily="34" charset="0"/>
+                </a:defRPr>
+              </a:lvl4pPr>
+              <a:lvl5pPr marL="2057400" indent="-228600">
+                <a:defRPr>
+                  <a:solidFill>
+                    <a:schemeClr val="tx1"/>
+                  </a:solidFill>
+                  <a:latin typeface="Calibri" panose="020F0502020204030204" pitchFamily="34" charset="0"/>
+                </a:defRPr>
+              </a:lvl5pPr>
+              <a:lvl6pPr marL="2514600" indent="-228600" eaLnBrk="0" fontAlgn="base" hangingPunct="0">
+                <a:spcBef>
+                  <a:spcPct val="0"/>
+                </a:spcBef>
+                <a:spcAft>
+                  <a:spcPct val="0"/>
+                </a:spcAft>
+                <a:defRPr>
+                  <a:solidFill>
+                    <a:schemeClr val="tx1"/>
+                  </a:solidFill>
+                  <a:latin typeface="Calibri" panose="020F0502020204030204" pitchFamily="34" charset="0"/>
+                </a:defRPr>
+              </a:lvl6pPr>
+              <a:lvl7pPr marL="2971800" indent="-228600" eaLnBrk="0" fontAlgn="base" hangingPunct="0">
+                <a:spcBef>
+                  <a:spcPct val="0"/>
+                </a:spcBef>
+                <a:spcAft>
+                  <a:spcPct val="0"/>
+                </a:spcAft>
+                <a:defRPr>
+                  <a:solidFill>
+                    <a:schemeClr val="tx1"/>
+                  </a:solidFill>
+                  <a:latin typeface="Calibri" panose="020F0502020204030204" pitchFamily="34" charset="0"/>
+                </a:defRPr>
+              </a:lvl7pPr>
+              <a:lvl8pPr marL="3429000" indent="-228600" eaLnBrk="0" fontAlgn="base" hangingPunct="0">
+                <a:spcBef>
+                  <a:spcPct val="0"/>
+                </a:spcBef>
+                <a:spcAft>
+                  <a:spcPct val="0"/>
+                </a:spcAft>
+                <a:defRPr>
+                  <a:solidFill>
+                    <a:schemeClr val="tx1"/>
+                  </a:solidFill>
+                  <a:latin typeface="Calibri" panose="020F0502020204030204" pitchFamily="34" charset="0"/>
+                </a:defRPr>
+              </a:lvl8pPr>
+              <a:lvl9pPr marL="3886200" indent="-228600" eaLnBrk="0" fontAlgn="base" hangingPunct="0">
+                <a:spcBef>
+                  <a:spcPct val="0"/>
+                </a:spcBef>
+                <a:spcAft>
+                  <a:spcPct val="0"/>
+                </a:spcAft>
+                <a:defRPr>
+                  <a:solidFill>
+                    <a:schemeClr val="tx1"/>
+                  </a:solidFill>
+                  <a:latin typeface="Calibri" panose="020F0502020204030204" pitchFamily="34" charset="0"/>
+                </a:defRPr>
+              </a:lvl9pPr>
+            </a:lstStyle>
+            <a:p>
+              <a:pPr algn="ctr" eaLnBrk="1" hangingPunct="1"/>
+              <a:r>
+                <a:rPr lang="en-US" altLang="en-US" sz="1400" dirty="0">
+                  <a:solidFill>
+                    <a:schemeClr val="bg2"/>
+                  </a:solidFill>
+                  <a:latin typeface="Arial" panose="020B0604020202020204" pitchFamily="34" charset="0"/>
+                  <a:cs typeface="Arial" panose="020B0604020202020204" pitchFamily="34" charset="0"/>
+                </a:rPr>
+                <a:t>Amazon Simple Storage Service (Amazon S3)</a:t>
+              </a:r>
+            </a:p>
+          </p:txBody>
+        </p:sp>
+      </p:grpSp>
+      <p:grpSp>
+        <p:nvGrpSpPr>
+          <p:cNvPr id="14" name="Group 13">
+            <a:extLst>
+              <a:ext uri="{FF2B5EF4-FFF2-40B4-BE49-F238E27FC236}">
+                <a16:creationId xmlns:a16="http://schemas.microsoft.com/office/drawing/2014/main" id="{09EDFA45-D122-4212-B6A6-DF5701A791B1}"/>
+              </a:ext>
+            </a:extLst>
+          </p:cNvPr>
+          <p:cNvGrpSpPr/>
+          <p:nvPr/>
+        </p:nvGrpSpPr>
+        <p:grpSpPr>
+          <a:xfrm>
+            <a:off x="535348" y="2622274"/>
+            <a:ext cx="1073150" cy="836415"/>
+            <a:chOff x="535348" y="3488000"/>
+            <a:chExt cx="1073150" cy="836415"/>
+          </a:xfrm>
+        </p:grpSpPr>
+        <p:pic>
+          <p:nvPicPr>
+            <p:cNvPr id="10" name="Graphic 23">
+              <a:extLst>
+                <a:ext uri="{FF2B5EF4-FFF2-40B4-BE49-F238E27FC236}">
+                  <a16:creationId xmlns:a16="http://schemas.microsoft.com/office/drawing/2014/main" id="{8CFB4383-878A-4445-AE67-1BEECD2F5F3B}"/>
+                </a:ext>
+              </a:extLst>
+            </p:cNvPr>
+            <p:cNvPicPr>
+              <a:picLocks noChangeAspect="1" noChangeArrowheads="1"/>
+            </p:cNvPicPr>
+            <p:nvPr/>
+          </p:nvPicPr>
+          <p:blipFill>
+            <a:blip r:embed="rId4">
+              <a:extLst>
+                <a:ext uri="{28A0092B-C50C-407E-A947-70E740481C1C}">
+                  <a14:useLocalDpi xmlns:a14="http://schemas.microsoft.com/office/drawing/2010/main" val="0"/>
+                </a:ext>
+              </a:extLst>
+            </a:blip>
+            <a:srcRect/>
+            <a:stretch>
+              <a:fillRect/>
+            </a:stretch>
+          </p:blipFill>
+          <p:spPr bwMode="auto">
+            <a:xfrm>
+              <a:off x="836973" y="3488000"/>
+              <a:ext cx="469900" cy="469900"/>
+            </a:xfrm>
+            <a:prstGeom prst="rect">
+              <a:avLst/>
+            </a:prstGeom>
+            <a:noFill/>
+            <a:ln>
+              <a:noFill/>
+            </a:ln>
+            <a:extLst>
+              <a:ext uri="{909E8E84-426E-40DD-AFC4-6F175D3DCCD1}">
+                <a14:hiddenFill xmlns:a14="http://schemas.microsoft.com/office/drawing/2010/main">
+                  <a:solidFill>
+                    <a:srgbClr val="FFFFFF"/>
+                  </a:solidFill>
+                </a14:hiddenFill>
+              </a:ext>
+              <a:ext uri="{91240B29-F687-4F45-9708-019B960494DF}">
+                <a14:hiddenLine xmlns:a14="http://schemas.microsoft.com/office/drawing/2010/main" w="9525">
+                  <a:solidFill>
+                    <a:srgbClr val="000000"/>
+                  </a:solidFill>
+                  <a:miter lim="800000"/>
+                  <a:headEnd/>
+                  <a:tailEnd/>
+                </a14:hiddenLine>
+              </a:ext>
+            </a:extLst>
+          </p:spPr>
+        </p:pic>
+        <p:sp>
+          <p:nvSpPr>
+            <p:cNvPr id="11" name="TextBox 24">
+              <a:extLst>
+                <a:ext uri="{FF2B5EF4-FFF2-40B4-BE49-F238E27FC236}">
+                  <a16:creationId xmlns:a16="http://schemas.microsoft.com/office/drawing/2014/main" id="{C8ED1F99-D81E-4E50-A87B-6540A178C206}"/>
+                </a:ext>
+              </a:extLst>
+            </p:cNvPr>
+            <p:cNvSpPr txBox="1">
+              <a:spLocks noChangeArrowheads="1"/>
+            </p:cNvSpPr>
+            <p:nvPr/>
+          </p:nvSpPr>
+          <p:spPr bwMode="auto">
+            <a:xfrm>
+              <a:off x="535348" y="4016638"/>
+              <a:ext cx="1073150" cy="307777"/>
+            </a:xfrm>
+            <a:prstGeom prst="rect">
+              <a:avLst/>
+            </a:prstGeom>
+            <a:noFill/>
+            <a:ln>
+              <a:noFill/>
+            </a:ln>
+            <a:extLst>
+              <a:ext uri="{909E8E84-426E-40DD-AFC4-6F175D3DCCD1}">
+                <a14:hiddenFill xmlns:a14="http://schemas.microsoft.com/office/drawing/2010/main">
+                  <a:solidFill>
+                    <a:srgbClr val="FFFFFF"/>
+                  </a:solidFill>
+                </a14:hiddenFill>
+              </a:ext>
+              <a:ext uri="{91240B29-F687-4F45-9708-019B960494DF}">
+                <a14:hiddenLine xmlns:a14="http://schemas.microsoft.com/office/drawing/2010/main" w="9525">
+                  <a:solidFill>
+                    <a:srgbClr val="000000"/>
+                  </a:solidFill>
+                  <a:miter lim="800000"/>
+                  <a:headEnd/>
+                  <a:tailEnd/>
+                </a14:hiddenLine>
+              </a:ext>
+            </a:extLst>
+          </p:spPr>
+          <p:txBody>
+            <a:bodyPr>
+              <a:spAutoFit/>
+            </a:bodyPr>
+            <a:lstStyle>
+              <a:lvl1pPr>
+                <a:defRPr>
+                  <a:solidFill>
+                    <a:schemeClr val="tx1"/>
+                  </a:solidFill>
+                  <a:latin typeface="Calibri" panose="020F0502020204030204" pitchFamily="34" charset="0"/>
+                </a:defRPr>
+              </a:lvl1pPr>
+              <a:lvl2pPr marL="742950" indent="-285750">
+                <a:defRPr>
+                  <a:solidFill>
+                    <a:schemeClr val="tx1"/>
+                  </a:solidFill>
+                  <a:latin typeface="Calibri" panose="020F0502020204030204" pitchFamily="34" charset="0"/>
+                </a:defRPr>
+              </a:lvl2pPr>
+              <a:lvl3pPr marL="1143000" indent="-228600">
+                <a:defRPr>
+                  <a:solidFill>
+                    <a:schemeClr val="tx1"/>
+                  </a:solidFill>
+                  <a:latin typeface="Calibri" panose="020F0502020204030204" pitchFamily="34" charset="0"/>
+                </a:defRPr>
+              </a:lvl3pPr>
+              <a:lvl4pPr marL="1600200" indent="-228600">
+                <a:defRPr>
+                  <a:solidFill>
+                    <a:schemeClr val="tx1"/>
+                  </a:solidFill>
+                  <a:latin typeface="Calibri" panose="020F0502020204030204" pitchFamily="34" charset="0"/>
+                </a:defRPr>
+              </a:lvl4pPr>
+              <a:lvl5pPr marL="2057400" indent="-228600">
+                <a:defRPr>
+                  <a:solidFill>
+                    <a:schemeClr val="tx1"/>
+                  </a:solidFill>
+                  <a:latin typeface="Calibri" panose="020F0502020204030204" pitchFamily="34" charset="0"/>
+                </a:defRPr>
+              </a:lvl5pPr>
+              <a:lvl6pPr marL="2514600" indent="-228600" eaLnBrk="0" fontAlgn="base" hangingPunct="0">
+                <a:spcBef>
+                  <a:spcPct val="0"/>
+                </a:spcBef>
+                <a:spcAft>
+                  <a:spcPct val="0"/>
+                </a:spcAft>
+                <a:defRPr>
+                  <a:solidFill>
+                    <a:schemeClr val="tx1"/>
+                  </a:solidFill>
+                  <a:latin typeface="Calibri" panose="020F0502020204030204" pitchFamily="34" charset="0"/>
+                </a:defRPr>
+              </a:lvl6pPr>
+              <a:lvl7pPr marL="2971800" indent="-228600" eaLnBrk="0" fontAlgn="base" hangingPunct="0">
+                <a:spcBef>
+                  <a:spcPct val="0"/>
+                </a:spcBef>
+                <a:spcAft>
+                  <a:spcPct val="0"/>
+                </a:spcAft>
+                <a:defRPr>
+                  <a:solidFill>
+                    <a:schemeClr val="tx1"/>
+                  </a:solidFill>
+                  <a:latin typeface="Calibri" panose="020F0502020204030204" pitchFamily="34" charset="0"/>
+                </a:defRPr>
+              </a:lvl7pPr>
+              <a:lvl8pPr marL="3429000" indent="-228600" eaLnBrk="0" fontAlgn="base" hangingPunct="0">
+                <a:spcBef>
+                  <a:spcPct val="0"/>
+                </a:spcBef>
+                <a:spcAft>
+                  <a:spcPct val="0"/>
+                </a:spcAft>
+                <a:defRPr>
+                  <a:solidFill>
+                    <a:schemeClr val="tx1"/>
+                  </a:solidFill>
+                  <a:latin typeface="Calibri" panose="020F0502020204030204" pitchFamily="34" charset="0"/>
+                </a:defRPr>
+              </a:lvl8pPr>
+              <a:lvl9pPr marL="3886200" indent="-228600" eaLnBrk="0" fontAlgn="base" hangingPunct="0">
+                <a:spcBef>
+                  <a:spcPct val="0"/>
+                </a:spcBef>
+                <a:spcAft>
+                  <a:spcPct val="0"/>
+                </a:spcAft>
+                <a:defRPr>
+                  <a:solidFill>
+                    <a:schemeClr val="tx1"/>
+                  </a:solidFill>
+                  <a:latin typeface="Calibri" panose="020F0502020204030204" pitchFamily="34" charset="0"/>
+                </a:defRPr>
+              </a:lvl9pPr>
+            </a:lstStyle>
+            <a:p>
+              <a:pPr algn="ctr" eaLnBrk="1" hangingPunct="1"/>
+              <a:r>
+                <a:rPr lang="en-US" altLang="en-US" sz="1400" dirty="0">
+                  <a:solidFill>
+                    <a:schemeClr val="bg1"/>
+                  </a:solidFill>
+                  <a:latin typeface="Arial" panose="020B0604020202020204" pitchFamily="34" charset="0"/>
+                  <a:cs typeface="Arial" panose="020B0604020202020204" pitchFamily="34" charset="0"/>
+                </a:rPr>
+                <a:t>Client</a:t>
+              </a:r>
+            </a:p>
+          </p:txBody>
+        </p:sp>
+      </p:grpSp>
+      <p:cxnSp>
+        <p:nvCxnSpPr>
+          <p:cNvPr id="13" name="Straight Arrow Connector 12">
+            <a:extLst>
+              <a:ext uri="{FF2B5EF4-FFF2-40B4-BE49-F238E27FC236}">
+                <a16:creationId xmlns:a16="http://schemas.microsoft.com/office/drawing/2014/main" id="{48D62946-01E7-4551-8634-1F5F0DF90A64}"/>
+              </a:ext>
+            </a:extLst>
+          </p:cNvPr>
+          <p:cNvCxnSpPr>
+            <a:cxnSpLocks/>
+          </p:cNvCxnSpPr>
+          <p:nvPr/>
+        </p:nvCxnSpPr>
+        <p:spPr>
+          <a:xfrm>
+            <a:off x="1482437" y="2988733"/>
+            <a:ext cx="2092036" cy="730857"/>
+          </a:xfrm>
+          <a:prstGeom prst="straightConnector1">
+            <a:avLst/>
+          </a:prstGeom>
+          <a:ln w="19050">
+            <a:solidFill>
+              <a:schemeClr val="bg2"/>
+            </a:solidFill>
+            <a:headEnd type="none" w="med" len="med"/>
+            <a:tailEnd type="arrow" w="med" len="med"/>
+          </a:ln>
+        </p:spPr>
+        <p:style>
+          <a:lnRef idx="1">
+            <a:schemeClr val="accent1"/>
+          </a:lnRef>
+          <a:fillRef idx="0">
+            <a:schemeClr val="accent1"/>
+          </a:fillRef>
+          <a:effectRef idx="0">
+            <a:schemeClr val="accent1"/>
+          </a:effectRef>
+          <a:fontRef idx="minor">
+            <a:schemeClr val="tx1"/>
+          </a:fontRef>
+        </p:style>
+      </p:cxnSp>
+      <p:grpSp>
+        <p:nvGrpSpPr>
+          <p:cNvPr id="17" name="Group 16">
+            <a:extLst>
+              <a:ext uri="{FF2B5EF4-FFF2-40B4-BE49-F238E27FC236}">
+                <a16:creationId xmlns:a16="http://schemas.microsoft.com/office/drawing/2014/main" id="{249C7FC1-7071-4E2D-B179-91C10A029075}"/>
+              </a:ext>
+            </a:extLst>
+          </p:cNvPr>
+          <p:cNvGrpSpPr/>
+          <p:nvPr/>
+        </p:nvGrpSpPr>
+        <p:grpSpPr>
+          <a:xfrm>
+            <a:off x="6252941" y="3228552"/>
+            <a:ext cx="2279650" cy="1285220"/>
+            <a:chOff x="5927581" y="6151129"/>
+            <a:chExt cx="2279650" cy="1285220"/>
+          </a:xfrm>
+        </p:grpSpPr>
+        <p:pic>
+          <p:nvPicPr>
+            <p:cNvPr id="15" name="Graphic 19">
+              <a:extLst>
+                <a:ext uri="{FF2B5EF4-FFF2-40B4-BE49-F238E27FC236}">
+                  <a16:creationId xmlns:a16="http://schemas.microsoft.com/office/drawing/2014/main" id="{11BC917A-B02A-4C1F-88E1-643A27F4AC95}"/>
+                </a:ext>
+              </a:extLst>
+            </p:cNvPr>
+            <p:cNvPicPr>
+              <a:picLocks noChangeAspect="1" noChangeArrowheads="1"/>
+            </p:cNvPicPr>
+            <p:nvPr/>
+          </p:nvPicPr>
+          <p:blipFill>
+            <a:blip r:embed="rId5">
+              <a:extLst>
+                <a:ext uri="{28A0092B-C50C-407E-A947-70E740481C1C}">
+                  <a14:useLocalDpi xmlns:a14="http://schemas.microsoft.com/office/drawing/2010/main" val="0"/>
+                </a:ext>
+              </a:extLst>
+            </a:blip>
+            <a:srcRect/>
+            <a:stretch>
+              <a:fillRect/>
+            </a:stretch>
+          </p:blipFill>
+          <p:spPr bwMode="auto">
+            <a:xfrm>
+              <a:off x="6676881" y="6151129"/>
+              <a:ext cx="762000" cy="762000"/>
+            </a:xfrm>
+            <a:prstGeom prst="rect">
+              <a:avLst/>
+            </a:prstGeom>
+            <a:noFill/>
+            <a:ln>
+              <a:noFill/>
+            </a:ln>
+            <a:extLst>
+              <a:ext uri="{909E8E84-426E-40DD-AFC4-6F175D3DCCD1}">
+                <a14:hiddenFill xmlns:a14="http://schemas.microsoft.com/office/drawing/2010/main">
+                  <a:solidFill>
+                    <a:srgbClr val="FFFFFF"/>
+                  </a:solidFill>
+                </a14:hiddenFill>
+              </a:ext>
+              <a:ext uri="{91240B29-F687-4F45-9708-019B960494DF}">
+                <a14:hiddenLine xmlns:a14="http://schemas.microsoft.com/office/drawing/2010/main" w="9525">
+                  <a:solidFill>
+                    <a:srgbClr val="000000"/>
+                  </a:solidFill>
+                  <a:miter lim="800000"/>
+                  <a:headEnd/>
+                  <a:tailEnd/>
+                </a14:hiddenLine>
+              </a:ext>
+            </a:extLst>
+          </p:spPr>
+        </p:pic>
+        <p:sp>
+          <p:nvSpPr>
+            <p:cNvPr id="16" name="TextBox 12">
+              <a:extLst>
+                <a:ext uri="{FF2B5EF4-FFF2-40B4-BE49-F238E27FC236}">
+                  <a16:creationId xmlns:a16="http://schemas.microsoft.com/office/drawing/2014/main" id="{7A1471AF-BFC2-4CEE-AE35-10CDFB184BE7}"/>
+                </a:ext>
+              </a:extLst>
+            </p:cNvPr>
+            <p:cNvSpPr txBox="1">
+              <a:spLocks noChangeArrowheads="1"/>
+            </p:cNvSpPr>
+            <p:nvPr/>
+          </p:nvSpPr>
+          <p:spPr bwMode="auto">
+            <a:xfrm>
+              <a:off x="5927581" y="6913129"/>
+              <a:ext cx="2279650" cy="523220"/>
+            </a:xfrm>
+            <a:prstGeom prst="rect">
+              <a:avLst/>
+            </a:prstGeom>
+            <a:noFill/>
+            <a:ln>
+              <a:noFill/>
+            </a:ln>
+            <a:extLst>
+              <a:ext uri="{909E8E84-426E-40DD-AFC4-6F175D3DCCD1}">
+                <a14:hiddenFill xmlns:a14="http://schemas.microsoft.com/office/drawing/2010/main">
+                  <a:solidFill>
+                    <a:srgbClr val="FFFFFF"/>
+                  </a:solidFill>
+                </a14:hiddenFill>
+              </a:ext>
+              <a:ext uri="{91240B29-F687-4F45-9708-019B960494DF}">
+                <a14:hiddenLine xmlns:a14="http://schemas.microsoft.com/office/drawing/2010/main" w="9525">
+                  <a:solidFill>
+                    <a:srgbClr val="000000"/>
+                  </a:solidFill>
+                  <a:miter lim="800000"/>
+                  <a:headEnd/>
+                  <a:tailEnd/>
+                </a14:hiddenLine>
+              </a:ext>
+            </a:extLst>
+          </p:spPr>
+          <p:txBody>
+            <a:bodyPr>
+              <a:spAutoFit/>
+            </a:bodyPr>
+            <a:lstStyle>
+              <a:lvl1pPr>
+                <a:defRPr>
+                  <a:solidFill>
+                    <a:schemeClr val="tx1"/>
+                  </a:solidFill>
+                  <a:latin typeface="Calibri" panose="020F0502020204030204" pitchFamily="34" charset="0"/>
+                </a:defRPr>
+              </a:lvl1pPr>
+              <a:lvl2pPr marL="742950" indent="-285750">
+                <a:defRPr>
+                  <a:solidFill>
+                    <a:schemeClr val="tx1"/>
+                  </a:solidFill>
+                  <a:latin typeface="Calibri" panose="020F0502020204030204" pitchFamily="34" charset="0"/>
+                </a:defRPr>
+              </a:lvl2pPr>
+              <a:lvl3pPr marL="1143000" indent="-228600">
+                <a:defRPr>
+                  <a:solidFill>
+                    <a:schemeClr val="tx1"/>
+                  </a:solidFill>
+                  <a:latin typeface="Calibri" panose="020F0502020204030204" pitchFamily="34" charset="0"/>
+                </a:defRPr>
+              </a:lvl3pPr>
+              <a:lvl4pPr marL="1600200" indent="-228600">
+                <a:defRPr>
+                  <a:solidFill>
+                    <a:schemeClr val="tx1"/>
+                  </a:solidFill>
+                  <a:latin typeface="Calibri" panose="020F0502020204030204" pitchFamily="34" charset="0"/>
+                </a:defRPr>
+              </a:lvl4pPr>
+              <a:lvl5pPr marL="2057400" indent="-228600">
+                <a:defRPr>
+                  <a:solidFill>
+                    <a:schemeClr val="tx1"/>
+                  </a:solidFill>
+                  <a:latin typeface="Calibri" panose="020F0502020204030204" pitchFamily="34" charset="0"/>
+                </a:defRPr>
+              </a:lvl5pPr>
+              <a:lvl6pPr marL="2514600" indent="-228600" eaLnBrk="0" fontAlgn="base" hangingPunct="0">
+                <a:spcBef>
+                  <a:spcPct val="0"/>
+                </a:spcBef>
+                <a:spcAft>
+                  <a:spcPct val="0"/>
+                </a:spcAft>
+                <a:defRPr>
+                  <a:solidFill>
+                    <a:schemeClr val="tx1"/>
+                  </a:solidFill>
+                  <a:latin typeface="Calibri" panose="020F0502020204030204" pitchFamily="34" charset="0"/>
+                </a:defRPr>
+              </a:lvl6pPr>
+              <a:lvl7pPr marL="2971800" indent="-228600" eaLnBrk="0" fontAlgn="base" hangingPunct="0">
+                <a:spcBef>
+                  <a:spcPct val="0"/>
+                </a:spcBef>
+                <a:spcAft>
+                  <a:spcPct val="0"/>
+                </a:spcAft>
+                <a:defRPr>
+                  <a:solidFill>
+                    <a:schemeClr val="tx1"/>
+                  </a:solidFill>
+                  <a:latin typeface="Calibri" panose="020F0502020204030204" pitchFamily="34" charset="0"/>
+                </a:defRPr>
+              </a:lvl7pPr>
+              <a:lvl8pPr marL="3429000" indent="-228600" eaLnBrk="0" fontAlgn="base" hangingPunct="0">
+                <a:spcBef>
+                  <a:spcPct val="0"/>
+                </a:spcBef>
+                <a:spcAft>
+                  <a:spcPct val="0"/>
+                </a:spcAft>
+                <a:defRPr>
+                  <a:solidFill>
+                    <a:schemeClr val="tx1"/>
+                  </a:solidFill>
+                  <a:latin typeface="Calibri" panose="020F0502020204030204" pitchFamily="34" charset="0"/>
+                </a:defRPr>
+              </a:lvl8pPr>
+              <a:lvl9pPr marL="3886200" indent="-228600" eaLnBrk="0" fontAlgn="base" hangingPunct="0">
+                <a:spcBef>
+                  <a:spcPct val="0"/>
+                </a:spcBef>
+                <a:spcAft>
+                  <a:spcPct val="0"/>
+                </a:spcAft>
+                <a:defRPr>
+                  <a:solidFill>
+                    <a:schemeClr val="tx1"/>
+                  </a:solidFill>
+                  <a:latin typeface="Calibri" panose="020F0502020204030204" pitchFamily="34" charset="0"/>
+                </a:defRPr>
+              </a:lvl9pPr>
+            </a:lstStyle>
+            <a:p>
+              <a:pPr algn="ctr" eaLnBrk="1" hangingPunct="1"/>
+              <a:r>
+                <a:rPr lang="en-US" altLang="en-US" sz="1400" dirty="0">
+                  <a:solidFill>
+                    <a:schemeClr val="bg2"/>
+                  </a:solidFill>
+                  <a:latin typeface="Arial" panose="020B0604020202020204" pitchFamily="34" charset="0"/>
+                  <a:cs typeface="Arial" panose="020B0604020202020204" pitchFamily="34" charset="0"/>
+                </a:rPr>
+                <a:t>AWS Identity and Access Management (IAM)</a:t>
+              </a:r>
+            </a:p>
+          </p:txBody>
+        </p:sp>
+      </p:grpSp>
+      <p:cxnSp>
+        <p:nvCxnSpPr>
+          <p:cNvPr id="18" name="Straight Arrow Connector 17">
+            <a:extLst>
+              <a:ext uri="{FF2B5EF4-FFF2-40B4-BE49-F238E27FC236}">
+                <a16:creationId xmlns:a16="http://schemas.microsoft.com/office/drawing/2014/main" id="{C900675B-B9C3-4615-81C0-C8F0ABC1C34C}"/>
+              </a:ext>
+            </a:extLst>
+          </p:cNvPr>
+          <p:cNvCxnSpPr>
+            <a:cxnSpLocks/>
+          </p:cNvCxnSpPr>
+          <p:nvPr/>
+        </p:nvCxnSpPr>
+        <p:spPr>
+          <a:xfrm>
+            <a:off x="4937552" y="3744161"/>
+            <a:ext cx="1773382" cy="0"/>
+          </a:xfrm>
+          <a:prstGeom prst="straightConnector1">
+            <a:avLst/>
+          </a:prstGeom>
+          <a:ln w="19050">
+            <a:solidFill>
+              <a:schemeClr val="bg2"/>
+            </a:solidFill>
+            <a:headEnd type="none" w="med" len="med"/>
+            <a:tailEnd type="arrow" w="med" len="med"/>
+          </a:ln>
+        </p:spPr>
+        <p:style>
+          <a:lnRef idx="1">
+            <a:schemeClr val="accent1"/>
+          </a:lnRef>
+          <a:fillRef idx="0">
+            <a:schemeClr val="accent1"/>
+          </a:fillRef>
+          <a:effectRef idx="0">
+            <a:schemeClr val="accent1"/>
+          </a:effectRef>
+          <a:fontRef idx="minor">
+            <a:schemeClr val="tx1"/>
+          </a:fontRef>
+        </p:style>
+      </p:cxnSp>
+      <p:cxnSp>
+        <p:nvCxnSpPr>
+          <p:cNvPr id="21" name="Straight Arrow Connector 20">
+            <a:extLst>
+              <a:ext uri="{FF2B5EF4-FFF2-40B4-BE49-F238E27FC236}">
+                <a16:creationId xmlns:a16="http://schemas.microsoft.com/office/drawing/2014/main" id="{ED4B8A36-ADFC-4103-AC7B-47586B8CE9A7}"/>
+              </a:ext>
+            </a:extLst>
+          </p:cNvPr>
+          <p:cNvCxnSpPr>
+            <a:cxnSpLocks/>
+          </p:cNvCxnSpPr>
+          <p:nvPr/>
+        </p:nvCxnSpPr>
+        <p:spPr>
+          <a:xfrm>
+            <a:off x="8040970" y="3723024"/>
+            <a:ext cx="1773382" cy="0"/>
+          </a:xfrm>
+          <a:prstGeom prst="straightConnector1">
+            <a:avLst/>
+          </a:prstGeom>
+          <a:ln w="19050">
+            <a:solidFill>
+              <a:schemeClr val="bg2"/>
+            </a:solidFill>
+            <a:headEnd type="none" w="med" len="med"/>
+            <a:tailEnd type="arrow" w="med" len="med"/>
+          </a:ln>
+        </p:spPr>
+        <p:style>
+          <a:lnRef idx="1">
+            <a:schemeClr val="accent1"/>
+          </a:lnRef>
+          <a:fillRef idx="0">
+            <a:schemeClr val="accent1"/>
+          </a:fillRef>
+          <a:effectRef idx="0">
+            <a:schemeClr val="accent1"/>
+          </a:effectRef>
+          <a:fontRef idx="minor">
+            <a:schemeClr val="tx1"/>
+          </a:fontRef>
+        </p:style>
+      </p:cxnSp>
+      <p:sp>
+        <p:nvSpPr>
+          <p:cNvPr id="22" name="TextBox 12">
+            <a:extLst>
+              <a:ext uri="{FF2B5EF4-FFF2-40B4-BE49-F238E27FC236}">
+                <a16:creationId xmlns:a16="http://schemas.microsoft.com/office/drawing/2014/main" id="{777E5AB8-072C-4B8E-81B1-382A4AA72380}"/>
+              </a:ext>
+            </a:extLst>
+          </p:cNvPr>
+          <p:cNvSpPr txBox="1">
+            <a:spLocks noChangeArrowheads="1"/>
+          </p:cNvSpPr>
+          <p:nvPr/>
+        </p:nvSpPr>
+        <p:spPr bwMode="auto">
+          <a:xfrm>
+            <a:off x="494687" y="1361519"/>
+            <a:ext cx="6217840" cy="461665"/>
+          </a:xfrm>
+          <a:prstGeom prst="rect">
+            <a:avLst/>
+          </a:prstGeom>
+          <a:noFill/>
+          <a:ln>
+            <a:noFill/>
+          </a:ln>
+          <a:extLst>
+            <a:ext uri="{909E8E84-426E-40DD-AFC4-6F175D3DCCD1}">
+              <a14:hiddenFill xmlns:a14="http://schemas.microsoft.com/office/drawing/2010/main">
+                <a:solidFill>
+                  <a:srgbClr val="FFFFFF"/>
+                </a:solidFill>
+              </a14:hiddenFill>
+            </a:ext>
+            <a:ext uri="{91240B29-F687-4F45-9708-019B960494DF}">
+              <a14:hiddenLine xmlns:a14="http://schemas.microsoft.com/office/drawing/2010/main" w="9525">
+                <a:solidFill>
+                  <a:srgbClr val="000000"/>
+                </a:solidFill>
+                <a:miter lim="800000"/>
+                <a:headEnd/>
+                <a:tailEnd/>
+              </a14:hiddenLine>
+            </a:ext>
+          </a:extLst>
+        </p:spPr>
+        <p:txBody>
+          <a:bodyPr wrap="square">
+            <a:spAutoFit/>
+          </a:bodyPr>
+          <a:lstStyle>
+            <a:lvl1pPr>
+              <a:defRPr>
+                <a:solidFill>
+                  <a:schemeClr val="tx1"/>
+                </a:solidFill>
+                <a:latin typeface="Calibri" panose="020F0502020204030204" pitchFamily="34" charset="0"/>
+              </a:defRPr>
+            </a:lvl1pPr>
+            <a:lvl2pPr marL="742950" indent="-285750">
+              <a:defRPr>
+                <a:solidFill>
+                  <a:schemeClr val="tx1"/>
+                </a:solidFill>
+                <a:latin typeface="Calibri" panose="020F0502020204030204" pitchFamily="34" charset="0"/>
+              </a:defRPr>
+            </a:lvl2pPr>
+            <a:lvl3pPr marL="1143000" indent="-228600">
+              <a:defRPr>
+                <a:solidFill>
+                  <a:schemeClr val="tx1"/>
+                </a:solidFill>
+                <a:latin typeface="Calibri" panose="020F0502020204030204" pitchFamily="34" charset="0"/>
+              </a:defRPr>
+            </a:lvl3pPr>
+            <a:lvl4pPr marL="1600200" indent="-228600">
+              <a:defRPr>
+                <a:solidFill>
+                  <a:schemeClr val="tx1"/>
+                </a:solidFill>
+                <a:latin typeface="Calibri" panose="020F0502020204030204" pitchFamily="34" charset="0"/>
+              </a:defRPr>
+            </a:lvl4pPr>
+            <a:lvl5pPr marL="2057400" indent="-228600">
+              <a:defRPr>
+                <a:solidFill>
+                  <a:schemeClr val="tx1"/>
+                </a:solidFill>
+                <a:latin typeface="Calibri" panose="020F0502020204030204" pitchFamily="34" charset="0"/>
+              </a:defRPr>
+            </a:lvl5pPr>
+            <a:lvl6pPr marL="2514600" indent="-228600" eaLnBrk="0" fontAlgn="base" hangingPunct="0">
+              <a:spcBef>
+                <a:spcPct val="0"/>
+              </a:spcBef>
+              <a:spcAft>
+                <a:spcPct val="0"/>
+              </a:spcAft>
+              <a:defRPr>
+                <a:solidFill>
+                  <a:schemeClr val="tx1"/>
+                </a:solidFill>
+                <a:latin typeface="Calibri" panose="020F0502020204030204" pitchFamily="34" charset="0"/>
+              </a:defRPr>
+            </a:lvl6pPr>
+            <a:lvl7pPr marL="2971800" indent="-228600" eaLnBrk="0" fontAlgn="base" hangingPunct="0">
+              <a:spcBef>
+                <a:spcPct val="0"/>
+              </a:spcBef>
+              <a:spcAft>
+                <a:spcPct val="0"/>
+              </a:spcAft>
+              <a:defRPr>
+                <a:solidFill>
+                  <a:schemeClr val="tx1"/>
+                </a:solidFill>
+                <a:latin typeface="Calibri" panose="020F0502020204030204" pitchFamily="34" charset="0"/>
+              </a:defRPr>
+            </a:lvl7pPr>
+            <a:lvl8pPr marL="3429000" indent="-228600" eaLnBrk="0" fontAlgn="base" hangingPunct="0">
+              <a:spcBef>
+                <a:spcPct val="0"/>
+              </a:spcBef>
+              <a:spcAft>
+                <a:spcPct val="0"/>
+              </a:spcAft>
+              <a:defRPr>
+                <a:solidFill>
+                  <a:schemeClr val="tx1"/>
+                </a:solidFill>
+                <a:latin typeface="Calibri" panose="020F0502020204030204" pitchFamily="34" charset="0"/>
+              </a:defRPr>
+            </a:lvl8pPr>
+            <a:lvl9pPr marL="3886200" indent="-228600" eaLnBrk="0" fontAlgn="base" hangingPunct="0">
+              <a:spcBef>
+                <a:spcPct val="0"/>
+              </a:spcBef>
+              <a:spcAft>
+                <a:spcPct val="0"/>
+              </a:spcAft>
+              <a:defRPr>
+                <a:solidFill>
+                  <a:schemeClr val="tx1"/>
+                </a:solidFill>
+                <a:latin typeface="Calibri" panose="020F0502020204030204" pitchFamily="34" charset="0"/>
+              </a:defRPr>
+            </a:lvl9pPr>
+          </a:lstStyle>
+          <a:p>
+            <a:pPr eaLnBrk="1" hangingPunct="1"/>
+            <a:r>
+              <a:rPr lang="en-US" altLang="en-US" sz="2400" dirty="0">
+                <a:solidFill>
+                  <a:schemeClr val="bg2"/>
+                </a:solidFill>
+                <a:latin typeface="Arial" panose="020B0604020202020204" pitchFamily="34" charset="0"/>
+                <a:cs typeface="Arial" panose="020B0604020202020204" pitchFamily="34" charset="0"/>
+              </a:rPr>
+              <a:t>How Serverless File Sharing Page Works?</a:t>
+            </a:r>
+          </a:p>
+        </p:txBody>
+      </p:sp>
+      <p:grpSp>
+        <p:nvGrpSpPr>
+          <p:cNvPr id="26" name="Group 25">
+            <a:extLst>
+              <a:ext uri="{FF2B5EF4-FFF2-40B4-BE49-F238E27FC236}">
+                <a16:creationId xmlns:a16="http://schemas.microsoft.com/office/drawing/2014/main" id="{24FB8F68-5907-4E99-942E-10503B857206}"/>
+              </a:ext>
+            </a:extLst>
+          </p:cNvPr>
+          <p:cNvGrpSpPr/>
+          <p:nvPr/>
+        </p:nvGrpSpPr>
+        <p:grpSpPr>
+          <a:xfrm>
+            <a:off x="1814724" y="3554684"/>
+            <a:ext cx="1364348" cy="469900"/>
+            <a:chOff x="1856329" y="3178220"/>
+            <a:chExt cx="1364348" cy="469900"/>
+          </a:xfrm>
+        </p:grpSpPr>
+        <p:sp>
+          <p:nvSpPr>
+            <p:cNvPr id="24" name="TextBox 41">
+              <a:extLst>
+                <a:ext uri="{FF2B5EF4-FFF2-40B4-BE49-F238E27FC236}">
+                  <a16:creationId xmlns:a16="http://schemas.microsoft.com/office/drawing/2014/main" id="{74D4E772-D5B8-4ED8-84E0-0BF701BBFE02}"/>
+                </a:ext>
+              </a:extLst>
+            </p:cNvPr>
+            <p:cNvSpPr txBox="1">
+              <a:spLocks noChangeArrowheads="1"/>
+            </p:cNvSpPr>
+            <p:nvPr/>
+          </p:nvSpPr>
+          <p:spPr bwMode="auto">
+            <a:xfrm>
+              <a:off x="2147527" y="3282365"/>
+              <a:ext cx="1073150" cy="261610"/>
+            </a:xfrm>
+            <a:prstGeom prst="rect">
+              <a:avLst/>
+            </a:prstGeom>
+            <a:noFill/>
+            <a:ln>
+              <a:noFill/>
+            </a:ln>
+            <a:extLst>
+              <a:ext uri="{909E8E84-426E-40DD-AFC4-6F175D3DCCD1}">
+                <a14:hiddenFill xmlns:a14="http://schemas.microsoft.com/office/drawing/2010/main">
+                  <a:solidFill>
+                    <a:srgbClr val="FFFFFF"/>
+                  </a:solidFill>
+                </a14:hiddenFill>
+              </a:ext>
+              <a:ext uri="{91240B29-F687-4F45-9708-019B960494DF}">
+                <a14:hiddenLine xmlns:a14="http://schemas.microsoft.com/office/drawing/2010/main" w="9525">
+                  <a:solidFill>
+                    <a:srgbClr val="000000"/>
+                  </a:solidFill>
+                  <a:miter lim="800000"/>
+                  <a:headEnd/>
+                  <a:tailEnd/>
+                </a14:hiddenLine>
+              </a:ext>
+            </a:extLst>
+          </p:spPr>
+          <p:txBody>
+            <a:bodyPr>
+              <a:spAutoFit/>
+            </a:bodyPr>
+            <a:lstStyle>
+              <a:lvl1pPr>
+                <a:defRPr>
+                  <a:solidFill>
+                    <a:schemeClr val="tx1"/>
+                  </a:solidFill>
+                  <a:latin typeface="Calibri" panose="020F0502020204030204" pitchFamily="34" charset="0"/>
+                </a:defRPr>
+              </a:lvl1pPr>
+              <a:lvl2pPr marL="742950" indent="-285750">
+                <a:defRPr>
+                  <a:solidFill>
+                    <a:schemeClr val="tx1"/>
+                  </a:solidFill>
+                  <a:latin typeface="Calibri" panose="020F0502020204030204" pitchFamily="34" charset="0"/>
+                </a:defRPr>
+              </a:lvl2pPr>
+              <a:lvl3pPr marL="1143000" indent="-228600">
+                <a:defRPr>
+                  <a:solidFill>
+                    <a:schemeClr val="tx1"/>
+                  </a:solidFill>
+                  <a:latin typeface="Calibri" panose="020F0502020204030204" pitchFamily="34" charset="0"/>
+                </a:defRPr>
+              </a:lvl3pPr>
+              <a:lvl4pPr marL="1600200" indent="-228600">
+                <a:defRPr>
+                  <a:solidFill>
+                    <a:schemeClr val="tx1"/>
+                  </a:solidFill>
+                  <a:latin typeface="Calibri" panose="020F0502020204030204" pitchFamily="34" charset="0"/>
+                </a:defRPr>
+              </a:lvl4pPr>
+              <a:lvl5pPr marL="2057400" indent="-228600">
+                <a:defRPr>
+                  <a:solidFill>
+                    <a:schemeClr val="tx1"/>
+                  </a:solidFill>
+                  <a:latin typeface="Calibri" panose="020F0502020204030204" pitchFamily="34" charset="0"/>
+                </a:defRPr>
+              </a:lvl5pPr>
+              <a:lvl6pPr marL="2514600" indent="-228600" eaLnBrk="0" fontAlgn="base" hangingPunct="0">
+                <a:spcBef>
+                  <a:spcPct val="0"/>
+                </a:spcBef>
+                <a:spcAft>
+                  <a:spcPct val="0"/>
+                </a:spcAft>
+                <a:defRPr>
+                  <a:solidFill>
+                    <a:schemeClr val="tx1"/>
+                  </a:solidFill>
+                  <a:latin typeface="Calibri" panose="020F0502020204030204" pitchFamily="34" charset="0"/>
+                </a:defRPr>
+              </a:lvl6pPr>
+              <a:lvl7pPr marL="2971800" indent="-228600" eaLnBrk="0" fontAlgn="base" hangingPunct="0">
+                <a:spcBef>
+                  <a:spcPct val="0"/>
+                </a:spcBef>
+                <a:spcAft>
+                  <a:spcPct val="0"/>
+                </a:spcAft>
+                <a:defRPr>
+                  <a:solidFill>
+                    <a:schemeClr val="tx1"/>
+                  </a:solidFill>
+                  <a:latin typeface="Calibri" panose="020F0502020204030204" pitchFamily="34" charset="0"/>
+                </a:defRPr>
+              </a:lvl7pPr>
+              <a:lvl8pPr marL="3429000" indent="-228600" eaLnBrk="0" fontAlgn="base" hangingPunct="0">
+                <a:spcBef>
+                  <a:spcPct val="0"/>
+                </a:spcBef>
+                <a:spcAft>
+                  <a:spcPct val="0"/>
+                </a:spcAft>
+                <a:defRPr>
+                  <a:solidFill>
+                    <a:schemeClr val="tx1"/>
+                  </a:solidFill>
+                  <a:latin typeface="Calibri" panose="020F0502020204030204" pitchFamily="34" charset="0"/>
+                </a:defRPr>
+              </a:lvl8pPr>
+              <a:lvl9pPr marL="3886200" indent="-228600" eaLnBrk="0" fontAlgn="base" hangingPunct="0">
+                <a:spcBef>
+                  <a:spcPct val="0"/>
+                </a:spcBef>
+                <a:spcAft>
+                  <a:spcPct val="0"/>
+                </a:spcAft>
+                <a:defRPr>
+                  <a:solidFill>
+                    <a:schemeClr val="tx1"/>
+                  </a:solidFill>
+                  <a:latin typeface="Calibri" panose="020F0502020204030204" pitchFamily="34" charset="0"/>
+                </a:defRPr>
+              </a:lvl9pPr>
+            </a:lstStyle>
+            <a:p>
+              <a:pPr algn="ctr" eaLnBrk="1" hangingPunct="1"/>
+              <a:r>
+                <a:rPr lang="en-US" altLang="en-US" sz="1100" dirty="0">
+                  <a:solidFill>
+                    <a:schemeClr val="bg1"/>
+                  </a:solidFill>
+                  <a:latin typeface="Arial" panose="020B0604020202020204" pitchFamily="34" charset="0"/>
+                  <a:cs typeface="Arial" panose="020B0604020202020204" pitchFamily="34" charset="0"/>
+                </a:rPr>
+                <a:t>AWS SDK</a:t>
+              </a:r>
+            </a:p>
+          </p:txBody>
+        </p:sp>
+        <p:pic>
+          <p:nvPicPr>
+            <p:cNvPr id="25" name="Graphic 42">
+              <a:extLst>
+                <a:ext uri="{FF2B5EF4-FFF2-40B4-BE49-F238E27FC236}">
+                  <a16:creationId xmlns:a16="http://schemas.microsoft.com/office/drawing/2014/main" id="{F2BF131C-8D9F-4311-9F9C-C257C5891649}"/>
+                </a:ext>
+              </a:extLst>
+            </p:cNvPr>
+            <p:cNvPicPr>
+              <a:picLocks noChangeAspect="1" noChangeArrowheads="1"/>
+            </p:cNvPicPr>
+            <p:nvPr/>
+          </p:nvPicPr>
+          <p:blipFill>
+            <a:blip r:embed="rId6">
+              <a:extLst>
+                <a:ext uri="{28A0092B-C50C-407E-A947-70E740481C1C}">
+                  <a14:useLocalDpi xmlns:a14="http://schemas.microsoft.com/office/drawing/2010/main" val="0"/>
+                </a:ext>
+              </a:extLst>
+            </a:blip>
+            <a:srcRect/>
+            <a:stretch>
+              <a:fillRect/>
+            </a:stretch>
+          </p:blipFill>
+          <p:spPr bwMode="auto">
+            <a:xfrm>
+              <a:off x="1856329" y="3178220"/>
+              <a:ext cx="469900" cy="469900"/>
+            </a:xfrm>
+            <a:prstGeom prst="rect">
+              <a:avLst/>
+            </a:prstGeom>
+            <a:noFill/>
+            <a:ln>
+              <a:noFill/>
+            </a:ln>
+            <a:extLst>
+              <a:ext uri="{909E8E84-426E-40DD-AFC4-6F175D3DCCD1}">
+                <a14:hiddenFill xmlns:a14="http://schemas.microsoft.com/office/drawing/2010/main">
+                  <a:solidFill>
+                    <a:srgbClr val="FFFFFF"/>
+                  </a:solidFill>
+                </a14:hiddenFill>
+              </a:ext>
+              <a:ext uri="{91240B29-F687-4F45-9708-019B960494DF}">
+                <a14:hiddenLine xmlns:a14="http://schemas.microsoft.com/office/drawing/2010/main" w="9525">
+                  <a:solidFill>
+                    <a:srgbClr val="000000"/>
+                  </a:solidFill>
+                  <a:miter lim="800000"/>
+                  <a:headEnd/>
+                  <a:tailEnd/>
+                </a14:hiddenLine>
+              </a:ext>
+            </a:extLst>
+          </p:spPr>
+        </p:pic>
+      </p:grpSp>
+      <p:cxnSp>
+        <p:nvCxnSpPr>
+          <p:cNvPr id="54" name="Straight Connector 53">
+            <a:extLst>
+              <a:ext uri="{FF2B5EF4-FFF2-40B4-BE49-F238E27FC236}">
+                <a16:creationId xmlns:a16="http://schemas.microsoft.com/office/drawing/2014/main" id="{30C20D39-987F-4EF6-B461-EB23A8278565}"/>
+              </a:ext>
+            </a:extLst>
+          </p:cNvPr>
+          <p:cNvCxnSpPr>
+            <a:cxnSpLocks/>
+          </p:cNvCxnSpPr>
+          <p:nvPr/>
+        </p:nvCxnSpPr>
+        <p:spPr>
+          <a:xfrm>
+            <a:off x="3255315" y="2235542"/>
+            <a:ext cx="0" cy="3496734"/>
+          </a:xfrm>
+          <a:prstGeom prst="line">
+            <a:avLst/>
+          </a:prstGeom>
+          <a:ln w="38100">
+            <a:solidFill>
+              <a:schemeClr val="bg2">
+                <a:lumMod val="50000"/>
+              </a:schemeClr>
+            </a:solidFill>
+            <a:prstDash val="dash"/>
+          </a:ln>
+        </p:spPr>
+        <p:style>
+          <a:lnRef idx="1">
+            <a:schemeClr val="accent1"/>
+          </a:lnRef>
+          <a:fillRef idx="0">
+            <a:schemeClr val="accent1"/>
+          </a:fillRef>
+          <a:effectRef idx="0">
+            <a:schemeClr val="accent1"/>
+          </a:effectRef>
+          <a:fontRef idx="minor">
+            <a:schemeClr val="tx1"/>
+          </a:fontRef>
+        </p:style>
+      </p:cxnSp>
+      <p:grpSp>
+        <p:nvGrpSpPr>
+          <p:cNvPr id="57" name="Group 56">
+            <a:extLst>
+              <a:ext uri="{FF2B5EF4-FFF2-40B4-BE49-F238E27FC236}">
+                <a16:creationId xmlns:a16="http://schemas.microsoft.com/office/drawing/2014/main" id="{BF14C51D-6379-42F2-8C70-CE699270CA5A}"/>
+              </a:ext>
+            </a:extLst>
+          </p:cNvPr>
+          <p:cNvGrpSpPr/>
+          <p:nvPr/>
+        </p:nvGrpSpPr>
+        <p:grpSpPr>
+          <a:xfrm>
+            <a:off x="535348" y="4428520"/>
+            <a:ext cx="1073150" cy="836415"/>
+            <a:chOff x="535348" y="3488000"/>
+            <a:chExt cx="1073150" cy="836415"/>
+          </a:xfrm>
+        </p:grpSpPr>
+        <p:pic>
+          <p:nvPicPr>
+            <p:cNvPr id="58" name="Graphic 23">
+              <a:extLst>
+                <a:ext uri="{FF2B5EF4-FFF2-40B4-BE49-F238E27FC236}">
+                  <a16:creationId xmlns:a16="http://schemas.microsoft.com/office/drawing/2014/main" id="{279F8F35-7F11-4FDA-9466-EE77C4141FCD}"/>
+                </a:ext>
+              </a:extLst>
+            </p:cNvPr>
+            <p:cNvPicPr>
+              <a:picLocks noChangeAspect="1" noChangeArrowheads="1"/>
+            </p:cNvPicPr>
+            <p:nvPr/>
+          </p:nvPicPr>
+          <p:blipFill>
+            <a:blip r:embed="rId4">
+              <a:extLst>
+                <a:ext uri="{28A0092B-C50C-407E-A947-70E740481C1C}">
+                  <a14:useLocalDpi xmlns:a14="http://schemas.microsoft.com/office/drawing/2010/main" val="0"/>
+                </a:ext>
+              </a:extLst>
+            </a:blip>
+            <a:srcRect/>
+            <a:stretch>
+              <a:fillRect/>
+            </a:stretch>
+          </p:blipFill>
+          <p:spPr bwMode="auto">
+            <a:xfrm>
+              <a:off x="836973" y="3488000"/>
+              <a:ext cx="469900" cy="469900"/>
+            </a:xfrm>
+            <a:prstGeom prst="rect">
+              <a:avLst/>
+            </a:prstGeom>
+            <a:noFill/>
+            <a:ln>
+              <a:noFill/>
+            </a:ln>
+            <a:extLst>
+              <a:ext uri="{909E8E84-426E-40DD-AFC4-6F175D3DCCD1}">
+                <a14:hiddenFill xmlns:a14="http://schemas.microsoft.com/office/drawing/2010/main">
+                  <a:solidFill>
+                    <a:srgbClr val="FFFFFF"/>
+                  </a:solidFill>
+                </a14:hiddenFill>
+              </a:ext>
+              <a:ext uri="{91240B29-F687-4F45-9708-019B960494DF}">
+                <a14:hiddenLine xmlns:a14="http://schemas.microsoft.com/office/drawing/2010/main" w="9525">
+                  <a:solidFill>
+                    <a:srgbClr val="000000"/>
+                  </a:solidFill>
+                  <a:miter lim="800000"/>
+                  <a:headEnd/>
+                  <a:tailEnd/>
+                </a14:hiddenLine>
+              </a:ext>
+            </a:extLst>
+          </p:spPr>
+        </p:pic>
+        <p:sp>
+          <p:nvSpPr>
+            <p:cNvPr id="59" name="TextBox 24">
+              <a:extLst>
+                <a:ext uri="{FF2B5EF4-FFF2-40B4-BE49-F238E27FC236}">
+                  <a16:creationId xmlns:a16="http://schemas.microsoft.com/office/drawing/2014/main" id="{D3FEEEAD-5DFE-42CC-B770-74A3375BB5A1}"/>
+                </a:ext>
+              </a:extLst>
+            </p:cNvPr>
+            <p:cNvSpPr txBox="1">
+              <a:spLocks noChangeArrowheads="1"/>
+            </p:cNvSpPr>
+            <p:nvPr/>
+          </p:nvSpPr>
+          <p:spPr bwMode="auto">
+            <a:xfrm>
+              <a:off x="535348" y="4016638"/>
+              <a:ext cx="1073150" cy="307777"/>
+            </a:xfrm>
+            <a:prstGeom prst="rect">
+              <a:avLst/>
+            </a:prstGeom>
+            <a:noFill/>
+            <a:ln>
+              <a:noFill/>
+            </a:ln>
+            <a:extLst>
+              <a:ext uri="{909E8E84-426E-40DD-AFC4-6F175D3DCCD1}">
+                <a14:hiddenFill xmlns:a14="http://schemas.microsoft.com/office/drawing/2010/main">
+                  <a:solidFill>
+                    <a:srgbClr val="FFFFFF"/>
+                  </a:solidFill>
+                </a14:hiddenFill>
+              </a:ext>
+              <a:ext uri="{91240B29-F687-4F45-9708-019B960494DF}">
+                <a14:hiddenLine xmlns:a14="http://schemas.microsoft.com/office/drawing/2010/main" w="9525">
+                  <a:solidFill>
+                    <a:srgbClr val="000000"/>
+                  </a:solidFill>
+                  <a:miter lim="800000"/>
+                  <a:headEnd/>
+                  <a:tailEnd/>
+                </a14:hiddenLine>
+              </a:ext>
+            </a:extLst>
+          </p:spPr>
+          <p:txBody>
+            <a:bodyPr>
+              <a:spAutoFit/>
+            </a:bodyPr>
+            <a:lstStyle>
+              <a:lvl1pPr>
+                <a:defRPr>
+                  <a:solidFill>
+                    <a:schemeClr val="tx1"/>
+                  </a:solidFill>
+                  <a:latin typeface="Calibri" panose="020F0502020204030204" pitchFamily="34" charset="0"/>
+                </a:defRPr>
+              </a:lvl1pPr>
+              <a:lvl2pPr marL="742950" indent="-285750">
+                <a:defRPr>
+                  <a:solidFill>
+                    <a:schemeClr val="tx1"/>
+                  </a:solidFill>
+                  <a:latin typeface="Calibri" panose="020F0502020204030204" pitchFamily="34" charset="0"/>
+                </a:defRPr>
+              </a:lvl2pPr>
+              <a:lvl3pPr marL="1143000" indent="-228600">
+                <a:defRPr>
+                  <a:solidFill>
+                    <a:schemeClr val="tx1"/>
+                  </a:solidFill>
+                  <a:latin typeface="Calibri" panose="020F0502020204030204" pitchFamily="34" charset="0"/>
+                </a:defRPr>
+              </a:lvl3pPr>
+              <a:lvl4pPr marL="1600200" indent="-228600">
+                <a:defRPr>
+                  <a:solidFill>
+                    <a:schemeClr val="tx1"/>
+                  </a:solidFill>
+                  <a:latin typeface="Calibri" panose="020F0502020204030204" pitchFamily="34" charset="0"/>
+                </a:defRPr>
+              </a:lvl4pPr>
+              <a:lvl5pPr marL="2057400" indent="-228600">
+                <a:defRPr>
+                  <a:solidFill>
+                    <a:schemeClr val="tx1"/>
+                  </a:solidFill>
+                  <a:latin typeface="Calibri" panose="020F0502020204030204" pitchFamily="34" charset="0"/>
+                </a:defRPr>
+              </a:lvl5pPr>
+              <a:lvl6pPr marL="2514600" indent="-228600" eaLnBrk="0" fontAlgn="base" hangingPunct="0">
+                <a:spcBef>
+                  <a:spcPct val="0"/>
+                </a:spcBef>
+                <a:spcAft>
+                  <a:spcPct val="0"/>
+                </a:spcAft>
+                <a:defRPr>
+                  <a:solidFill>
+                    <a:schemeClr val="tx1"/>
+                  </a:solidFill>
+                  <a:latin typeface="Calibri" panose="020F0502020204030204" pitchFamily="34" charset="0"/>
+                </a:defRPr>
+              </a:lvl6pPr>
+              <a:lvl7pPr marL="2971800" indent="-228600" eaLnBrk="0" fontAlgn="base" hangingPunct="0">
+                <a:spcBef>
+                  <a:spcPct val="0"/>
+                </a:spcBef>
+                <a:spcAft>
+                  <a:spcPct val="0"/>
+                </a:spcAft>
+                <a:defRPr>
+                  <a:solidFill>
+                    <a:schemeClr val="tx1"/>
+                  </a:solidFill>
+                  <a:latin typeface="Calibri" panose="020F0502020204030204" pitchFamily="34" charset="0"/>
+                </a:defRPr>
+              </a:lvl7pPr>
+              <a:lvl8pPr marL="3429000" indent="-228600" eaLnBrk="0" fontAlgn="base" hangingPunct="0">
+                <a:spcBef>
+                  <a:spcPct val="0"/>
+                </a:spcBef>
+                <a:spcAft>
+                  <a:spcPct val="0"/>
+                </a:spcAft>
+                <a:defRPr>
+                  <a:solidFill>
+                    <a:schemeClr val="tx1"/>
+                  </a:solidFill>
+                  <a:latin typeface="Calibri" panose="020F0502020204030204" pitchFamily="34" charset="0"/>
+                </a:defRPr>
+              </a:lvl8pPr>
+              <a:lvl9pPr marL="3886200" indent="-228600" eaLnBrk="0" fontAlgn="base" hangingPunct="0">
+                <a:spcBef>
+                  <a:spcPct val="0"/>
+                </a:spcBef>
+                <a:spcAft>
+                  <a:spcPct val="0"/>
+                </a:spcAft>
+                <a:defRPr>
+                  <a:solidFill>
+                    <a:schemeClr val="tx1"/>
+                  </a:solidFill>
+                  <a:latin typeface="Calibri" panose="020F0502020204030204" pitchFamily="34" charset="0"/>
+                </a:defRPr>
+              </a:lvl9pPr>
+            </a:lstStyle>
+            <a:p>
+              <a:pPr algn="ctr" eaLnBrk="1" hangingPunct="1"/>
+              <a:r>
+                <a:rPr lang="en-US" altLang="en-US" sz="1400" dirty="0">
+                  <a:solidFill>
+                    <a:schemeClr val="bg1"/>
+                  </a:solidFill>
+                  <a:latin typeface="Arial" panose="020B0604020202020204" pitchFamily="34" charset="0"/>
+                  <a:cs typeface="Arial" panose="020B0604020202020204" pitchFamily="34" charset="0"/>
+                </a:rPr>
+                <a:t>Client</a:t>
+              </a:r>
+            </a:p>
+          </p:txBody>
+        </p:sp>
+      </p:grpSp>
+      <p:cxnSp>
+        <p:nvCxnSpPr>
+          <p:cNvPr id="60" name="Straight Arrow Connector 59">
+            <a:extLst>
+              <a:ext uri="{FF2B5EF4-FFF2-40B4-BE49-F238E27FC236}">
+                <a16:creationId xmlns:a16="http://schemas.microsoft.com/office/drawing/2014/main" id="{A2199B5C-B54A-4C58-A55A-7B722F721B8A}"/>
+              </a:ext>
+            </a:extLst>
+          </p:cNvPr>
+          <p:cNvCxnSpPr>
+            <a:cxnSpLocks/>
+          </p:cNvCxnSpPr>
+          <p:nvPr/>
+        </p:nvCxnSpPr>
+        <p:spPr>
+          <a:xfrm flipV="1">
+            <a:off x="1482437" y="3871163"/>
+            <a:ext cx="2092036" cy="792307"/>
+          </a:xfrm>
+          <a:prstGeom prst="straightConnector1">
+            <a:avLst/>
+          </a:prstGeom>
+          <a:ln w="19050">
+            <a:solidFill>
+              <a:schemeClr val="bg2"/>
+            </a:solidFill>
+            <a:headEnd type="none" w="med" len="med"/>
+            <a:tailEnd type="arrow" w="med" len="med"/>
+          </a:ln>
+        </p:spPr>
+        <p:style>
+          <a:lnRef idx="1">
+            <a:schemeClr val="accent1"/>
+          </a:lnRef>
+          <a:fillRef idx="0">
+            <a:schemeClr val="accent1"/>
+          </a:fillRef>
+          <a:effectRef idx="0">
+            <a:schemeClr val="accent1"/>
+          </a:effectRef>
+          <a:fontRef idx="minor">
+            <a:schemeClr val="tx1"/>
+          </a:fontRef>
+        </p:style>
+      </p:cxnSp>
+    </p:spTree>
+    <p:extLst>
+      <p:ext uri="{BB962C8B-B14F-4D97-AF65-F5344CB8AC3E}">
+        <p14:creationId xmlns:p14="http://schemas.microsoft.com/office/powerpoint/2010/main" val="1876840396"/>
+      </p:ext>
+    </p:extLst>
+  </p:cSld>
+  <p:clrMapOvr>
+    <a:masterClrMapping/>
+  </p:clrMapOvr>
+</p:sld>
+</file>
+
 <file path=ppt/theme/theme1.xml><?xml version="1.0" encoding="utf-8"?>
 <a:theme xmlns:a="http://schemas.openxmlformats.org/drawingml/2006/main" name="Office Theme">
   <a:themeElements>

</xml_diff>

<commit_message>
Apply Tencent Cloud CDN setting to all posts
</commit_message>
<xml_diff>
--- a/assets/images/banners/BannerCreator.pptx
+++ b/assets/images/banners/BannerCreator.pptx
@@ -12,6 +12,7 @@
     <p:sldId id="260" r:id="rId6"/>
     <p:sldId id="262" r:id="rId7"/>
     <p:sldId id="263" r:id="rId8"/>
+    <p:sldId id="264" r:id="rId9"/>
   </p:sldIdLst>
   <p:sldSz cx="12192000" cy="6858000"/>
   <p:notesSz cx="6858000" cy="9144000"/>
@@ -326,7 +327,7 @@
           <a:p>
             <a:fld id="{BD8AEB8B-F03B-4148-B37B-28C602FB6DA0}" type="datetimeFigureOut">
               <a:rPr lang="en-US" smtClean="0"/>
-              <a:t>1/19/2022</a:t>
+              <a:t>2/17/22</a:t>
             </a:fld>
             <a:endParaRPr lang="en-US"/>
           </a:p>
@@ -524,7 +525,7 @@
           <a:p>
             <a:fld id="{BD8AEB8B-F03B-4148-B37B-28C602FB6DA0}" type="datetimeFigureOut">
               <a:rPr lang="en-US" smtClean="0"/>
-              <a:t>1/19/2022</a:t>
+              <a:t>2/17/22</a:t>
             </a:fld>
             <a:endParaRPr lang="en-US"/>
           </a:p>
@@ -732,7 +733,7 @@
           <a:p>
             <a:fld id="{BD8AEB8B-F03B-4148-B37B-28C602FB6DA0}" type="datetimeFigureOut">
               <a:rPr lang="en-US" smtClean="0"/>
-              <a:t>1/19/2022</a:t>
+              <a:t>2/17/22</a:t>
             </a:fld>
             <a:endParaRPr lang="en-US"/>
           </a:p>
@@ -930,7 +931,7 @@
           <a:p>
             <a:fld id="{BD8AEB8B-F03B-4148-B37B-28C602FB6DA0}" type="datetimeFigureOut">
               <a:rPr lang="en-US" smtClean="0"/>
-              <a:t>1/19/2022</a:t>
+              <a:t>2/17/22</a:t>
             </a:fld>
             <a:endParaRPr lang="en-US"/>
           </a:p>
@@ -1205,7 +1206,7 @@
           <a:p>
             <a:fld id="{BD8AEB8B-F03B-4148-B37B-28C602FB6DA0}" type="datetimeFigureOut">
               <a:rPr lang="en-US" smtClean="0"/>
-              <a:t>1/19/2022</a:t>
+              <a:t>2/17/22</a:t>
             </a:fld>
             <a:endParaRPr lang="en-US"/>
           </a:p>
@@ -1470,7 +1471,7 @@
           <a:p>
             <a:fld id="{BD8AEB8B-F03B-4148-B37B-28C602FB6DA0}" type="datetimeFigureOut">
               <a:rPr lang="en-US" smtClean="0"/>
-              <a:t>1/19/2022</a:t>
+              <a:t>2/17/22</a:t>
             </a:fld>
             <a:endParaRPr lang="en-US"/>
           </a:p>
@@ -1882,7 +1883,7 @@
           <a:p>
             <a:fld id="{BD8AEB8B-F03B-4148-B37B-28C602FB6DA0}" type="datetimeFigureOut">
               <a:rPr lang="en-US" smtClean="0"/>
-              <a:t>1/19/2022</a:t>
+              <a:t>2/17/22</a:t>
             </a:fld>
             <a:endParaRPr lang="en-US"/>
           </a:p>
@@ -2023,7 +2024,7 @@
           <a:p>
             <a:fld id="{BD8AEB8B-F03B-4148-B37B-28C602FB6DA0}" type="datetimeFigureOut">
               <a:rPr lang="en-US" smtClean="0"/>
-              <a:t>1/19/2022</a:t>
+              <a:t>2/17/22</a:t>
             </a:fld>
             <a:endParaRPr lang="en-US"/>
           </a:p>
@@ -2136,7 +2137,7 @@
           <a:p>
             <a:fld id="{BD8AEB8B-F03B-4148-B37B-28C602FB6DA0}" type="datetimeFigureOut">
               <a:rPr lang="en-US" smtClean="0"/>
-              <a:t>1/19/2022</a:t>
+              <a:t>2/17/22</a:t>
             </a:fld>
             <a:endParaRPr lang="en-US"/>
           </a:p>
@@ -2447,7 +2448,7 @@
           <a:p>
             <a:fld id="{BD8AEB8B-F03B-4148-B37B-28C602FB6DA0}" type="datetimeFigureOut">
               <a:rPr lang="en-US" smtClean="0"/>
-              <a:t>1/19/2022</a:t>
+              <a:t>2/17/22</a:t>
             </a:fld>
             <a:endParaRPr lang="en-US"/>
           </a:p>
@@ -2735,7 +2736,7 @@
           <a:p>
             <a:fld id="{BD8AEB8B-F03B-4148-B37B-28C602FB6DA0}" type="datetimeFigureOut">
               <a:rPr lang="en-US" smtClean="0"/>
-              <a:t>1/19/2022</a:t>
+              <a:t>2/17/22</a:t>
             </a:fld>
             <a:endParaRPr lang="en-US"/>
           </a:p>
@@ -2976,7 +2977,7 @@
           <a:p>
             <a:fld id="{BD8AEB8B-F03B-4148-B37B-28C602FB6DA0}" type="datetimeFigureOut">
               <a:rPr lang="en-US" smtClean="0"/>
-              <a:t>1/19/2022</a:t>
+              <a:t>2/17/22</a:t>
             </a:fld>
             <a:endParaRPr lang="en-US"/>
           </a:p>
@@ -6185,6 +6186,152 @@
 </p:sld>
 </file>
 
+<file path=ppt/slides/slide8.xml><?xml version="1.0" encoding="utf-8"?>
+<p:sld xmlns:a="http://schemas.openxmlformats.org/drawingml/2006/main" xmlns:r="http://schemas.openxmlformats.org/officeDocument/2006/relationships" xmlns:p="http://schemas.openxmlformats.org/presentationml/2006/main">
+  <p:cSld>
+    <p:spTree>
+      <p:nvGrpSpPr>
+        <p:cNvPr id="1" name=""/>
+        <p:cNvGrpSpPr/>
+        <p:nvPr/>
+      </p:nvGrpSpPr>
+      <p:grpSpPr>
+        <a:xfrm>
+          <a:off x="0" y="0"/>
+          <a:ext cx="0" cy="0"/>
+          <a:chOff x="0" y="0"/>
+          <a:chExt cx="0" cy="0"/>
+        </a:xfrm>
+      </p:grpSpPr>
+      <p:sp>
+        <p:nvSpPr>
+          <p:cNvPr id="6" name="Rectangle 5">
+            <a:extLst>
+              <a:ext uri="{FF2B5EF4-FFF2-40B4-BE49-F238E27FC236}">
+                <a16:creationId xmlns:a16="http://schemas.microsoft.com/office/drawing/2014/main" id="{0439AF00-8634-4701-946F-B6029D9D9A9D}"/>
+              </a:ext>
+            </a:extLst>
+          </p:cNvPr>
+          <p:cNvSpPr/>
+          <p:nvPr/>
+        </p:nvSpPr>
+        <p:spPr>
+          <a:xfrm>
+            <a:off x="-96253" y="-11576"/>
+            <a:ext cx="12304295" cy="7005934"/>
+          </a:xfrm>
+          <a:prstGeom prst="rect">
+            <a:avLst/>
+          </a:prstGeom>
+          <a:solidFill>
+            <a:schemeClr val="tx1">
+              <a:lumMod val="85000"/>
+              <a:lumOff val="15000"/>
+            </a:schemeClr>
+          </a:solidFill>
+        </p:spPr>
+        <p:style>
+          <a:lnRef idx="2">
+            <a:schemeClr val="dk1">
+              <a:shade val="50000"/>
+            </a:schemeClr>
+          </a:lnRef>
+          <a:fillRef idx="1">
+            <a:schemeClr val="dk1"/>
+          </a:fillRef>
+          <a:effectRef idx="0">
+            <a:schemeClr val="dk1"/>
+          </a:effectRef>
+          <a:fontRef idx="minor">
+            <a:schemeClr val="lt1"/>
+          </a:fontRef>
+        </p:style>
+        <p:txBody>
+          <a:bodyPr rtlCol="0" anchor="ctr"/>
+          <a:lstStyle/>
+          <a:p>
+            <a:pPr algn="ctr"/>
+            <a:endParaRPr lang="en-US" dirty="0"/>
+          </a:p>
+        </p:txBody>
+      </p:sp>
+      <p:pic>
+        <p:nvPicPr>
+          <p:cNvPr id="5" name="Picture 4" descr="A picture containing shape&#10;&#10;Description automatically generated">
+            <a:extLst>
+              <a:ext uri="{FF2B5EF4-FFF2-40B4-BE49-F238E27FC236}">
+                <a16:creationId xmlns:a16="http://schemas.microsoft.com/office/drawing/2014/main" id="{DD2477EB-F848-4747-84F6-DE3A1FDDE48F}"/>
+              </a:ext>
+            </a:extLst>
+          </p:cNvPr>
+          <p:cNvPicPr>
+            <a:picLocks noChangeAspect="1"/>
+          </p:cNvPicPr>
+          <p:nvPr/>
+        </p:nvPicPr>
+        <p:blipFill>
+          <a:blip r:embed="rId2">
+            <a:lum bright="70000" contrast="-70000"/>
+            <a:extLst>
+              <a:ext uri="{BEBA8EAE-BF5A-486C-A8C5-ECC9F3942E4B}">
+                <a14:imgProps xmlns:a14="http://schemas.microsoft.com/office/drawing/2010/main">
+                  <a14:imgLayer r:embed="rId3">
+                    <a14:imgEffect>
+                      <a14:backgroundRemoval t="8470" b="92896" l="4558" r="89779">
+                        <a14:foregroundMark x1="45994" y1="63388" x2="45994" y2="63388"/>
+                        <a14:foregroundMark x1="51105" y1="66120" x2="51105" y2="66120"/>
+                        <a14:foregroundMark x1="60221" y1="65301" x2="60221" y2="65301"/>
+                        <a14:foregroundMark x1="65331" y1="64481" x2="65331" y2="64481"/>
+                        <a14:foregroundMark x1="73481" y1="63934" x2="73481" y2="63934"/>
+                        <a14:foregroundMark x1="80387" y1="74863" x2="80387" y2="74863"/>
+                        <a14:foregroundMark x1="84254" y1="69399" x2="84254" y2="69399"/>
+                        <a14:foregroundMark x1="83840" y1="58470" x2="83840" y2="58470"/>
+                        <a14:foregroundMark x1="87155" y1="64754" x2="87155" y2="64754"/>
+                        <a14:foregroundMark x1="4696" y1="8743" x2="4696" y2="8743"/>
+                        <a14:foregroundMark x1="15470" y1="92896" x2="15470" y2="92896"/>
+                      </a14:backgroundRemoval>
+                    </a14:imgEffect>
+                    <a14:imgEffect>
+                      <a14:artisticGlowEdges/>
+                    </a14:imgEffect>
+                    <a14:imgEffect>
+                      <a14:saturation sat="0"/>
+                    </a14:imgEffect>
+                  </a14:imgLayer>
+                </a14:imgProps>
+              </a:ext>
+              <a:ext uri="{28A0092B-C50C-407E-A947-70E740481C1C}">
+                <a14:useLocalDpi xmlns:a14="http://schemas.microsoft.com/office/drawing/2010/main" val="0"/>
+              </a:ext>
+            </a:extLst>
+          </a:blip>
+          <a:stretch>
+            <a:fillRect/>
+          </a:stretch>
+        </p:blipFill>
+        <p:spPr>
+          <a:xfrm>
+            <a:off x="5967808" y="1855758"/>
+            <a:ext cx="6224192" cy="3146484"/>
+          </a:xfrm>
+          <a:prstGeom prst="rect">
+            <a:avLst/>
+          </a:prstGeom>
+        </p:spPr>
+      </p:pic>
+    </p:spTree>
+    <p:extLst>
+      <p:ext uri="{BB962C8B-B14F-4D97-AF65-F5344CB8AC3E}">
+        <p14:creationId xmlns:p14="http://schemas.microsoft.com/office/powerpoint/2010/main" val="108113946"/>
+      </p:ext>
+    </p:extLst>
+  </p:cSld>
+  <p:clrMapOvr>
+    <a:masterClrMapping/>
+  </p:clrMapOvr>
+</p:sld>
+</file>
+
 <file path=ppt/theme/theme1.xml><?xml version="1.0" encoding="utf-8"?>
 <a:theme xmlns:a="http://schemas.openxmlformats.org/drawingml/2006/main" name="Office Theme">
   <a:themeElements>

</xml_diff>